<commit_message>
Ajustes na PPt final
</commit_message>
<xml_diff>
--- a/Ppt-Final.pptx
+++ b/Ppt-Final.pptx
@@ -127,7 +127,7 @@
   </p:defaultTextStyle>
   <p:extLst>
     <p:ext uri="{EFAFB233-063F-42B5-8137-9DF3F51BA10A}">
-      <p15:sldGuideLst xmlns:p15="http://schemas.microsoft.com/office/powerpoint/2012/main" xmlns="">
+      <p15:sldGuideLst xmlns="" xmlns:p15="http://schemas.microsoft.com/office/powerpoint/2012/main">
         <p15:guide id="1" orient="horz" pos="2160">
           <p15:clr>
             <a:srgbClr val="A4A3A4"/>
@@ -4872,14 +4872,14 @@
           <a:r>
             <a:rPr lang="pt-BR" sz="1600" b="1" dirty="0" smtClean="0">
               <a:solidFill>
-                <a:srgbClr val="7030A0"/>
+                <a:srgbClr val="FFC000"/>
               </a:solidFill>
             </a:rPr>
             <a:t>Serviço ativo</a:t>
           </a:r>
           <a:endParaRPr lang="pt-BR" sz="1600" b="1" dirty="0">
             <a:solidFill>
-              <a:srgbClr val="7030A0"/>
+              <a:srgbClr val="FFC000"/>
             </a:solidFill>
           </a:endParaRPr>
         </a:p>
@@ -4909,7 +4909,11 @@
     </dgm:pt>
     <dgm:pt modelId="{505F4CD4-2686-42E6-95A9-7B89F6B9C74E}">
       <dgm:prSet phldrT="[Texto]" custT="1"/>
-      <dgm:spPr/>
+      <dgm:spPr>
+        <a:solidFill>
+          <a:srgbClr val="00B050"/>
+        </a:solidFill>
+      </dgm:spPr>
       <dgm:t>
         <a:bodyPr/>
         <a:lstStyle/>
@@ -4984,14 +4988,14 @@
           <a:r>
             <a:rPr lang="pt-BR" sz="1600" b="1" dirty="0" smtClean="0">
               <a:solidFill>
-                <a:srgbClr val="7030A0"/>
+                <a:srgbClr val="00B050"/>
               </a:solidFill>
             </a:rPr>
             <a:t>Regularidade de atividades acadêmicas</a:t>
           </a:r>
           <a:endParaRPr lang="pt-BR" sz="1600" b="1" dirty="0">
             <a:solidFill>
-              <a:srgbClr val="7030A0"/>
+              <a:srgbClr val="00B050"/>
             </a:solidFill>
           </a:endParaRPr>
         </a:p>
@@ -5142,15 +5146,48 @@
     </dgm:pt>
     <dgm:pt modelId="{00580EB5-6E14-41C9-BAE4-5D9B53114EEE}" type="pres">
       <dgm:prSet presAssocID="{AEC7EC48-8C02-4B20-8E1F-90500B617624}" presName="c1" presStyleLbl="node1" presStyleIdx="0" presStyleCnt="19"/>
-      <dgm:spPr/>
+      <dgm:spPr>
+        <a:solidFill>
+          <a:srgbClr val="0070C0"/>
+        </a:solidFill>
+      </dgm:spPr>
+      <dgm:t>
+        <a:bodyPr/>
+        <a:lstStyle/>
+        <a:p>
+          <a:endParaRPr lang="pt-BR"/>
+        </a:p>
+      </dgm:t>
     </dgm:pt>
     <dgm:pt modelId="{4448610D-4D4D-41F4-890F-69C4D3D935FC}" type="pres">
       <dgm:prSet presAssocID="{AEC7EC48-8C02-4B20-8E1F-90500B617624}" presName="c2" presStyleLbl="node1" presStyleIdx="1" presStyleCnt="19"/>
-      <dgm:spPr/>
+      <dgm:spPr>
+        <a:solidFill>
+          <a:srgbClr val="0070C0"/>
+        </a:solidFill>
+      </dgm:spPr>
+      <dgm:t>
+        <a:bodyPr/>
+        <a:lstStyle/>
+        <a:p>
+          <a:endParaRPr lang="pt-BR"/>
+        </a:p>
+      </dgm:t>
     </dgm:pt>
     <dgm:pt modelId="{E00C693B-520F-47D0-BF8F-47A0DB9CF440}" type="pres">
       <dgm:prSet presAssocID="{AEC7EC48-8C02-4B20-8E1F-90500B617624}" presName="c3" presStyleLbl="node1" presStyleIdx="2" presStyleCnt="19"/>
-      <dgm:spPr/>
+      <dgm:spPr>
+        <a:solidFill>
+          <a:srgbClr val="0070C0"/>
+        </a:solidFill>
+      </dgm:spPr>
+      <dgm:t>
+        <a:bodyPr/>
+        <a:lstStyle/>
+        <a:p>
+          <a:endParaRPr lang="pt-BR"/>
+        </a:p>
+      </dgm:t>
     </dgm:pt>
     <dgm:pt modelId="{2069A35E-31CE-4145-B4C3-65945DAC45DF}" type="pres">
       <dgm:prSet presAssocID="{AEC7EC48-8C02-4B20-8E1F-90500B617624}" presName="c4" presStyleLbl="node1" presStyleIdx="3" presStyleCnt="19"/>
@@ -5162,55 +5199,198 @@
     </dgm:pt>
     <dgm:pt modelId="{4A3BB8EA-5318-4840-908C-4C12AD3258F5}" type="pres">
       <dgm:prSet presAssocID="{AEC7EC48-8C02-4B20-8E1F-90500B617624}" presName="c6" presStyleLbl="node1" presStyleIdx="5" presStyleCnt="19"/>
-      <dgm:spPr/>
+      <dgm:spPr>
+        <a:solidFill>
+          <a:srgbClr val="0070C0"/>
+        </a:solidFill>
+      </dgm:spPr>
+      <dgm:t>
+        <a:bodyPr/>
+        <a:lstStyle/>
+        <a:p>
+          <a:endParaRPr lang="pt-BR"/>
+        </a:p>
+      </dgm:t>
     </dgm:pt>
     <dgm:pt modelId="{8CBDDA7E-4803-4C44-99D4-124C240D06E5}" type="pres">
       <dgm:prSet presAssocID="{AEC7EC48-8C02-4B20-8E1F-90500B617624}" presName="c7" presStyleLbl="node1" presStyleIdx="6" presStyleCnt="19"/>
-      <dgm:spPr/>
+      <dgm:spPr>
+        <a:solidFill>
+          <a:srgbClr val="0070C0"/>
+        </a:solidFill>
+      </dgm:spPr>
+      <dgm:t>
+        <a:bodyPr/>
+        <a:lstStyle/>
+        <a:p>
+          <a:endParaRPr lang="pt-BR"/>
+        </a:p>
+      </dgm:t>
     </dgm:pt>
     <dgm:pt modelId="{A8EDFAC4-0083-41BA-8FB4-0FBD5B49C7E9}" type="pres">
       <dgm:prSet presAssocID="{AEC7EC48-8C02-4B20-8E1F-90500B617624}" presName="c8" presStyleLbl="node1" presStyleIdx="7" presStyleCnt="19"/>
-      <dgm:spPr/>
+      <dgm:spPr>
+        <a:solidFill>
+          <a:srgbClr val="0070C0"/>
+        </a:solidFill>
+      </dgm:spPr>
+      <dgm:t>
+        <a:bodyPr/>
+        <a:lstStyle/>
+        <a:p>
+          <a:endParaRPr lang="pt-BR"/>
+        </a:p>
+      </dgm:t>
     </dgm:pt>
     <dgm:pt modelId="{F0E3306D-5F74-47EC-AD44-C46708318CFD}" type="pres">
       <dgm:prSet presAssocID="{AEC7EC48-8C02-4B20-8E1F-90500B617624}" presName="c9" presStyleLbl="node1" presStyleIdx="8" presStyleCnt="19"/>
-      <dgm:spPr/>
+      <dgm:spPr>
+        <a:solidFill>
+          <a:srgbClr val="0070C0"/>
+        </a:solidFill>
+      </dgm:spPr>
+      <dgm:t>
+        <a:bodyPr/>
+        <a:lstStyle/>
+        <a:p>
+          <a:endParaRPr lang="pt-BR"/>
+        </a:p>
+      </dgm:t>
     </dgm:pt>
     <dgm:pt modelId="{46AAA524-6750-4A40-81BB-1CA9ABF48930}" type="pres">
       <dgm:prSet presAssocID="{AEC7EC48-8C02-4B20-8E1F-90500B617624}" presName="c10" presStyleLbl="node1" presStyleIdx="9" presStyleCnt="19"/>
-      <dgm:spPr/>
+      <dgm:spPr>
+        <a:solidFill>
+          <a:srgbClr val="0070C0"/>
+        </a:solidFill>
+      </dgm:spPr>
+      <dgm:t>
+        <a:bodyPr/>
+        <a:lstStyle/>
+        <a:p>
+          <a:endParaRPr lang="pt-BR"/>
+        </a:p>
+      </dgm:t>
     </dgm:pt>
     <dgm:pt modelId="{4D92DDD5-8D64-4B0E-9FA3-4E4AE1700A15}" type="pres">
       <dgm:prSet presAssocID="{AEC7EC48-8C02-4B20-8E1F-90500B617624}" presName="c11" presStyleLbl="node1" presStyleIdx="10" presStyleCnt="19"/>
-      <dgm:spPr/>
+      <dgm:spPr>
+        <a:solidFill>
+          <a:srgbClr val="0070C0"/>
+        </a:solidFill>
+      </dgm:spPr>
+      <dgm:t>
+        <a:bodyPr/>
+        <a:lstStyle/>
+        <a:p>
+          <a:endParaRPr lang="pt-BR"/>
+        </a:p>
+      </dgm:t>
     </dgm:pt>
     <dgm:pt modelId="{91772DB1-3A7D-4EA5-81A7-86DAFFF585F2}" type="pres">
       <dgm:prSet presAssocID="{AEC7EC48-8C02-4B20-8E1F-90500B617624}" presName="c12" presStyleLbl="node1" presStyleIdx="11" presStyleCnt="19"/>
-      <dgm:spPr/>
+      <dgm:spPr>
+        <a:solidFill>
+          <a:srgbClr val="0070C0"/>
+        </a:solidFill>
+      </dgm:spPr>
+      <dgm:t>
+        <a:bodyPr/>
+        <a:lstStyle/>
+        <a:p>
+          <a:endParaRPr lang="pt-BR"/>
+        </a:p>
+      </dgm:t>
     </dgm:pt>
     <dgm:pt modelId="{3E862664-DC2C-4985-B968-AD77D73F8587}" type="pres">
       <dgm:prSet presAssocID="{AEC7EC48-8C02-4B20-8E1F-90500B617624}" presName="c13" presStyleLbl="node1" presStyleIdx="12" presStyleCnt="19"/>
-      <dgm:spPr/>
+      <dgm:spPr>
+        <a:solidFill>
+          <a:srgbClr val="0070C0"/>
+        </a:solidFill>
+      </dgm:spPr>
+      <dgm:t>
+        <a:bodyPr/>
+        <a:lstStyle/>
+        <a:p>
+          <a:endParaRPr lang="pt-BR"/>
+        </a:p>
+      </dgm:t>
     </dgm:pt>
     <dgm:pt modelId="{5581EE3E-EC0C-436D-8F48-E62FEC748958}" type="pres">
       <dgm:prSet presAssocID="{AEC7EC48-8C02-4B20-8E1F-90500B617624}" presName="c14" presStyleLbl="node1" presStyleIdx="13" presStyleCnt="19"/>
-      <dgm:spPr/>
+      <dgm:spPr>
+        <a:solidFill>
+          <a:srgbClr val="0070C0"/>
+        </a:solidFill>
+      </dgm:spPr>
+      <dgm:t>
+        <a:bodyPr/>
+        <a:lstStyle/>
+        <a:p>
+          <a:endParaRPr lang="pt-BR"/>
+        </a:p>
+      </dgm:t>
     </dgm:pt>
     <dgm:pt modelId="{AE908452-2532-491A-B351-C4711C5DE25B}" type="pres">
       <dgm:prSet presAssocID="{AEC7EC48-8C02-4B20-8E1F-90500B617624}" presName="c15" presStyleLbl="node1" presStyleIdx="14" presStyleCnt="19"/>
-      <dgm:spPr/>
+      <dgm:spPr>
+        <a:solidFill>
+          <a:srgbClr val="0070C0"/>
+        </a:solidFill>
+      </dgm:spPr>
+      <dgm:t>
+        <a:bodyPr/>
+        <a:lstStyle/>
+        <a:p>
+          <a:endParaRPr lang="pt-BR"/>
+        </a:p>
+      </dgm:t>
     </dgm:pt>
     <dgm:pt modelId="{41C0A3F5-B9FA-480F-9FE9-F65875326FBC}" type="pres">
       <dgm:prSet presAssocID="{AEC7EC48-8C02-4B20-8E1F-90500B617624}" presName="c16" presStyleLbl="node1" presStyleIdx="15" presStyleCnt="19"/>
-      <dgm:spPr/>
+      <dgm:spPr>
+        <a:solidFill>
+          <a:srgbClr val="0070C0"/>
+        </a:solidFill>
+      </dgm:spPr>
+      <dgm:t>
+        <a:bodyPr/>
+        <a:lstStyle/>
+        <a:p>
+          <a:endParaRPr lang="pt-BR"/>
+        </a:p>
+      </dgm:t>
     </dgm:pt>
     <dgm:pt modelId="{13E195AE-E1EA-4E19-97C6-55417BA5FEF1}" type="pres">
       <dgm:prSet presAssocID="{AEC7EC48-8C02-4B20-8E1F-90500B617624}" presName="c17" presStyleLbl="node1" presStyleIdx="16" presStyleCnt="19"/>
-      <dgm:spPr/>
+      <dgm:spPr>
+        <a:solidFill>
+          <a:srgbClr val="0070C0"/>
+        </a:solidFill>
+      </dgm:spPr>
+      <dgm:t>
+        <a:bodyPr/>
+        <a:lstStyle/>
+        <a:p>
+          <a:endParaRPr lang="pt-BR"/>
+        </a:p>
+      </dgm:t>
     </dgm:pt>
     <dgm:pt modelId="{E33FD6B8-956F-4C60-AB20-1143C5DCC8DD}" type="pres">
       <dgm:prSet presAssocID="{AEC7EC48-8C02-4B20-8E1F-90500B617624}" presName="c18" presStyleLbl="node1" presStyleIdx="17" presStyleCnt="19"/>
-      <dgm:spPr/>
+      <dgm:spPr>
+        <a:solidFill>
+          <a:srgbClr val="0070C0"/>
+        </a:solidFill>
+      </dgm:spPr>
+      <dgm:t>
+        <a:bodyPr/>
+        <a:lstStyle/>
+        <a:p>
+          <a:endParaRPr lang="pt-BR"/>
+        </a:p>
+      </dgm:t>
     </dgm:pt>
     <dgm:pt modelId="{8971B518-2617-4DA8-9693-53AC754B0610}" type="pres">
       <dgm:prSet presAssocID="{35D481EC-5A30-4509-A548-3FF1DB75A4B2}" presName="chevronComposite1" presStyleCnt="0"/>
@@ -5218,7 +5398,18 @@
     </dgm:pt>
     <dgm:pt modelId="{4AC40FF3-008F-4006-B5F6-29CDB6E77DEB}" type="pres">
       <dgm:prSet presAssocID="{35D481EC-5A30-4509-A548-3FF1DB75A4B2}" presName="chevron1" presStyleLbl="sibTrans2D1" presStyleIdx="0" presStyleCnt="4"/>
-      <dgm:spPr/>
+      <dgm:spPr>
+        <a:solidFill>
+          <a:srgbClr val="0070C0"/>
+        </a:solidFill>
+      </dgm:spPr>
+      <dgm:t>
+        <a:bodyPr/>
+        <a:lstStyle/>
+        <a:p>
+          <a:endParaRPr lang="pt-BR"/>
+        </a:p>
+      </dgm:t>
     </dgm:pt>
     <dgm:pt modelId="{D902790A-FE1A-46F4-BEEC-01C8E2E3BB21}" type="pres">
       <dgm:prSet presAssocID="{35D481EC-5A30-4509-A548-3FF1DB75A4B2}" presName="spChevron1" presStyleCnt="0"/>
@@ -5249,7 +5440,18 @@
     </dgm:pt>
     <dgm:pt modelId="{5510BB7F-E98E-4475-A087-C6391C783681}" type="pres">
       <dgm:prSet presAssocID="{E9B790F8-FE85-49B3-A297-89693CDC07BF}" presName="chevron1" presStyleLbl="sibTrans2D1" presStyleIdx="1" presStyleCnt="4" custLinFactNeighborX="-32832" custLinFactNeighborY="3004"/>
-      <dgm:spPr/>
+      <dgm:spPr>
+        <a:solidFill>
+          <a:srgbClr val="0070C0"/>
+        </a:solidFill>
+      </dgm:spPr>
+      <dgm:t>
+        <a:bodyPr/>
+        <a:lstStyle/>
+        <a:p>
+          <a:endParaRPr lang="pt-BR"/>
+        </a:p>
+      </dgm:t>
     </dgm:pt>
     <dgm:pt modelId="{5383089A-DE8F-4C30-8343-04430CDC116B}" type="pres">
       <dgm:prSet presAssocID="{E9B790F8-FE85-49B3-A297-89693CDC07BF}" presName="spChevron1" presStyleCnt="0"/>
@@ -5280,7 +5482,18 @@
     </dgm:pt>
     <dgm:pt modelId="{C5065143-8AF7-4AE9-A44E-5E4DF178427E}" type="pres">
       <dgm:prSet presAssocID="{7F461BAA-C4A6-40D8-A0E9-4E017EC132BE}" presName="chevron1" presStyleLbl="sibTrans2D1" presStyleIdx="2" presStyleCnt="4" custLinFactNeighborX="-37554" custLinFactNeighborY="3004"/>
-      <dgm:spPr/>
+      <dgm:spPr>
+        <a:solidFill>
+          <a:srgbClr val="FFC000"/>
+        </a:solidFill>
+      </dgm:spPr>
+      <dgm:t>
+        <a:bodyPr/>
+        <a:lstStyle/>
+        <a:p>
+          <a:endParaRPr lang="pt-BR"/>
+        </a:p>
+      </dgm:t>
     </dgm:pt>
     <dgm:pt modelId="{0B3ECFED-BEFB-4AD3-8B13-FE6A9DE76FBF}" type="pres">
       <dgm:prSet presAssocID="{7F461BAA-C4A6-40D8-A0E9-4E017EC132BE}" presName="spChevron1" presStyleCnt="0"/>
@@ -5311,7 +5524,18 @@
     </dgm:pt>
     <dgm:pt modelId="{B9E275C6-562A-432D-BC53-BE29329C92C7}" type="pres">
       <dgm:prSet presAssocID="{45B7446E-FBDF-439B-B7B5-639F3F563037}" presName="chevron1" presStyleLbl="sibTrans2D1" presStyleIdx="3" presStyleCnt="4"/>
-      <dgm:spPr/>
+      <dgm:spPr>
+        <a:solidFill>
+          <a:srgbClr val="00B050"/>
+        </a:solidFill>
+      </dgm:spPr>
+      <dgm:t>
+        <a:bodyPr/>
+        <a:lstStyle/>
+        <a:p>
+          <a:endParaRPr lang="pt-BR"/>
+        </a:p>
+      </dgm:t>
     </dgm:pt>
     <dgm:pt modelId="{A32425F3-1A05-480B-8C42-3867B5FF3B43}" type="pres">
       <dgm:prSet presAssocID="{45B7446E-FBDF-439B-B7B5-639F3F563037}" presName="spChevron1" presStyleCnt="0"/>
@@ -5416,7 +5640,7 @@
   <dgm:whole/>
   <dgm:extLst>
     <a:ext uri="http://schemas.microsoft.com/office/drawing/2008/diagram">
-      <dsp:dataModelExt xmlns:dsp="http://schemas.microsoft.com/office/drawing/2008/diagram" relId="rId9" minVer="http://schemas.openxmlformats.org/drawingml/2006/diagram"/>
+      <dsp:dataModelExt xmlns:dsp="http://schemas.microsoft.com/office/drawing/2008/diagram" relId="rId8" minVer="http://schemas.openxmlformats.org/drawingml/2006/diagram"/>
     </a:ext>
   </dgm:extLst>
 </dgm:dataModel>
@@ -5495,6 +5719,13 @@
         <a:lstStyle/>
         <a:p>
           <a:endParaRPr lang="pt-BR" b="1" dirty="0">
+            <a:ln>
+              <a:solidFill>
+                <a:schemeClr val="bg1">
+                  <a:lumMod val="75000"/>
+                </a:schemeClr>
+              </a:solidFill>
+            </a:ln>
             <a:solidFill>
               <a:srgbClr val="FF0000"/>
             </a:solidFill>
@@ -5641,7 +5872,11 @@
           <dgm:chPref val="3"/>
         </dgm:presLayoutVars>
       </dgm:prSet>
-      <dgm:spPr/>
+      <dgm:spPr>
+        <a:prstGeom prst="ellipse">
+          <a:avLst/>
+        </a:prstGeom>
+      </dgm:spPr>
       <dgm:t>
         <a:bodyPr/>
         <a:lstStyle/>
@@ -5776,7 +6011,11 @@
           <dgm:chPref val="3"/>
         </dgm:presLayoutVars>
       </dgm:prSet>
-      <dgm:spPr/>
+      <dgm:spPr>
+        <a:prstGeom prst="roundRect">
+          <a:avLst/>
+        </a:prstGeom>
+      </dgm:spPr>
       <dgm:t>
         <a:bodyPr/>
         <a:lstStyle/>
@@ -5799,12 +6038,12 @@
     <dgm:cxn modelId="{47F307E1-7ECF-43F0-8628-7A43B8568B8F}" type="presOf" srcId="{62D06435-42C5-4C37-A0F2-83E4A7B934B3}" destId="{8A7B2A75-ADCE-4543-B9AD-59C4E7FCD436}" srcOrd="0" destOrd="0" presId="urn:microsoft.com/office/officeart/2005/8/layout/hierarchy2"/>
     <dgm:cxn modelId="{FC0DF796-AA6A-4E74-AA0B-7AFF76797FB7}" srcId="{4050C737-9860-4B25-B3B3-C2F1FA2E1FAF}" destId="{CF015C9E-9BF7-4D93-97E5-18158D554CB5}" srcOrd="0" destOrd="0" parTransId="{E1D6D09E-BADB-489F-A2C5-A845050AB783}" sibTransId="{393DBABD-3BDE-4A87-9A98-F179BC16BEB8}"/>
     <dgm:cxn modelId="{C2095F03-A0AE-4AB2-9336-86C4CF0E2B34}" type="presOf" srcId="{E1D6D09E-BADB-489F-A2C5-A845050AB783}" destId="{40EC9B65-825A-4CFD-9FF3-3094A2D18072}" srcOrd="0" destOrd="0" presId="urn:microsoft.com/office/officeart/2005/8/layout/hierarchy2"/>
+    <dgm:cxn modelId="{39552CB3-1880-403C-9E8C-38B4652594E7}" type="presOf" srcId="{711E827C-9087-44DE-8DF3-26A34868DBA4}" destId="{A495C0D0-0E80-48DB-8154-D582C59B72C3}" srcOrd="0" destOrd="0" presId="urn:microsoft.com/office/officeart/2005/8/layout/hierarchy2"/>
     <dgm:cxn modelId="{1FBE4952-DE6C-4B1F-B7FC-9417CD67FB4C}" srcId="{62D06435-42C5-4C37-A0F2-83E4A7B934B3}" destId="{4050C737-9860-4B25-B3B3-C2F1FA2E1FAF}" srcOrd="0" destOrd="0" parTransId="{591EE9A3-43DE-493B-BA54-643DF4BC9A63}" sibTransId="{BBF949C2-C086-44C9-9914-F7DFE2B6414F}"/>
-    <dgm:cxn modelId="{39552CB3-1880-403C-9E8C-38B4652594E7}" type="presOf" srcId="{711E827C-9087-44DE-8DF3-26A34868DBA4}" destId="{A495C0D0-0E80-48DB-8154-D582C59B72C3}" srcOrd="0" destOrd="0" presId="urn:microsoft.com/office/officeart/2005/8/layout/hierarchy2"/>
     <dgm:cxn modelId="{3FDD80F5-076F-487A-BC4E-58DA54323B99}" type="presOf" srcId="{E1D6D09E-BADB-489F-A2C5-A845050AB783}" destId="{5A3F2215-C070-469D-8FAD-8B93D680F758}" srcOrd="1" destOrd="0" presId="urn:microsoft.com/office/officeart/2005/8/layout/hierarchy2"/>
     <dgm:cxn modelId="{9543CDCA-0550-45F8-9E61-480AE16FBB2C}" type="presOf" srcId="{CF015C9E-9BF7-4D93-97E5-18158D554CB5}" destId="{3F240D39-27BF-4E23-88E7-47F174716589}" srcOrd="0" destOrd="0" presId="urn:microsoft.com/office/officeart/2005/8/layout/hierarchy2"/>
+    <dgm:cxn modelId="{E62E3B82-BBC8-487C-BCFA-DB88AC2636FE}" type="presOf" srcId="{4AE0E92A-7832-4160-8C0B-8A8BA7CF080B}" destId="{2E20864C-51AA-4E41-B9EF-0C7D12A3BCFB}" srcOrd="1" destOrd="0" presId="urn:microsoft.com/office/officeart/2005/8/layout/hierarchy2"/>
     <dgm:cxn modelId="{12B9FEA0-FFF6-4795-BEA2-21EFD93FD823}" type="presOf" srcId="{4AE0E92A-7832-4160-8C0B-8A8BA7CF080B}" destId="{96677CEF-A1B8-4F89-9C60-579502C7ED3D}" srcOrd="0" destOrd="0" presId="urn:microsoft.com/office/officeart/2005/8/layout/hierarchy2"/>
-    <dgm:cxn modelId="{E62E3B82-BBC8-487C-BCFA-DB88AC2636FE}" type="presOf" srcId="{4AE0E92A-7832-4160-8C0B-8A8BA7CF080B}" destId="{2E20864C-51AA-4E41-B9EF-0C7D12A3BCFB}" srcOrd="1" destOrd="0" presId="urn:microsoft.com/office/officeart/2005/8/layout/hierarchy2"/>
     <dgm:cxn modelId="{3FABB688-9922-48E3-898C-E7750CDAC638}" srcId="{BD10C00A-EB8A-49DC-82EC-3AEECA527BEC}" destId="{711E827C-9087-44DE-8DF3-26A34868DBA4}" srcOrd="0" destOrd="0" parTransId="{5738801A-DCE2-426E-A766-9F33CA2EC25C}" sibTransId="{DCE8CEBE-03E3-483D-9F43-298E6ADCC249}"/>
     <dgm:cxn modelId="{4860E34A-3672-447D-9921-142374730D64}" type="presParOf" srcId="{8A7B2A75-ADCE-4543-B9AD-59C4E7FCD436}" destId="{64F7868B-37E6-40B0-B2FC-8264F4077BEF}" srcOrd="0" destOrd="0" presId="urn:microsoft.com/office/officeart/2005/8/layout/hierarchy2"/>
     <dgm:cxn modelId="{90A09036-AAB0-4452-8AE4-2D387559B0E7}" type="presParOf" srcId="{64F7868B-37E6-40B0-B2FC-8264F4077BEF}" destId="{C3BCA4F6-D50D-44F7-BF83-FDFD5F58570C}" srcOrd="0" destOrd="0" presId="urn:microsoft.com/office/officeart/2005/8/layout/hierarchy2"/>
@@ -7474,8 +7713,8 @@
       </dsp:nvSpPr>
       <dsp:spPr>
         <a:xfrm>
-          <a:off x="100326" y="1610148"/>
-          <a:ext cx="1385821" cy="456691"/>
+          <a:off x="88685" y="1742804"/>
+          <a:ext cx="1325309" cy="436749"/>
         </a:xfrm>
         <a:prstGeom prst="rect">
           <a:avLst/>
@@ -7531,8 +7770,8 @@
         </a:p>
       </dsp:txBody>
       <dsp:txXfrm>
-        <a:off x="100326" y="1610148"/>
-        <a:ext cx="1385821" cy="456691"/>
+        <a:off x="88685" y="1742804"/>
+        <a:ext cx="1325309" cy="436749"/>
       </dsp:txXfrm>
     </dsp:sp>
     <dsp:sp modelId="{00580EB5-6E14-41C9-BAE4-5D9B53114EEE}">
@@ -7542,19 +7781,14 @@
       </dsp:nvSpPr>
       <dsp:spPr>
         <a:xfrm>
-          <a:off x="98751" y="1471251"/>
-          <a:ext cx="110235" cy="110235"/>
+          <a:off x="87179" y="1609972"/>
+          <a:ext cx="105422" cy="105422"/>
         </a:xfrm>
         <a:prstGeom prst="ellipse">
           <a:avLst/>
         </a:prstGeom>
         <a:solidFill>
-          <a:schemeClr val="accent3">
-            <a:hueOff val="0"/>
-            <a:satOff val="0"/>
-            <a:lumOff val="0"/>
-            <a:alphaOff val="0"/>
-          </a:schemeClr>
+          <a:srgbClr val="0070C0"/>
         </a:solidFill>
         <a:ln>
           <a:noFill/>
@@ -7588,19 +7822,14 @@
       </dsp:nvSpPr>
       <dsp:spPr>
         <a:xfrm>
-          <a:off x="175916" y="1316921"/>
-          <a:ext cx="110235" cy="110235"/>
+          <a:off x="160974" y="1462380"/>
+          <a:ext cx="105422" cy="105422"/>
         </a:xfrm>
         <a:prstGeom prst="ellipse">
           <a:avLst/>
         </a:prstGeom>
         <a:solidFill>
-          <a:schemeClr val="accent3">
-            <a:hueOff val="8"/>
-            <a:satOff val="-2792"/>
-            <a:lumOff val="-654"/>
-            <a:alphaOff val="0"/>
-          </a:schemeClr>
+          <a:srgbClr val="0070C0"/>
         </a:solidFill>
         <a:ln>
           <a:noFill/>
@@ -7634,19 +7863,14 @@
       </dsp:nvSpPr>
       <dsp:spPr>
         <a:xfrm>
-          <a:off x="361112" y="1347787"/>
-          <a:ext cx="173227" cy="173227"/>
+          <a:off x="338084" y="1491899"/>
+          <a:ext cx="165663" cy="165663"/>
         </a:xfrm>
         <a:prstGeom prst="ellipse">
           <a:avLst/>
         </a:prstGeom>
         <a:solidFill>
-          <a:schemeClr val="accent3">
-            <a:hueOff val="15"/>
-            <a:satOff val="-5585"/>
-            <a:lumOff val="-1307"/>
-            <a:alphaOff val="0"/>
-          </a:schemeClr>
+          <a:srgbClr val="0070C0"/>
         </a:solidFill>
         <a:ln>
           <a:noFill/>
@@ -7680,8 +7904,8 @@
       </dsp:nvSpPr>
       <dsp:spPr>
         <a:xfrm>
-          <a:off x="515442" y="1178024"/>
-          <a:ext cx="110235" cy="110235"/>
+          <a:off x="485675" y="1329548"/>
+          <a:ext cx="105422" cy="105422"/>
         </a:xfrm>
         <a:prstGeom prst="ellipse">
           <a:avLst/>
@@ -7726,8 +7950,8 @@
       </dsp:nvSpPr>
       <dsp:spPr>
         <a:xfrm>
-          <a:off x="716072" y="1116292"/>
-          <a:ext cx="110235" cy="110235"/>
+          <a:off x="677544" y="1270512"/>
+          <a:ext cx="105422" cy="105422"/>
         </a:xfrm>
         <a:prstGeom prst="ellipse">
           <a:avLst/>
@@ -7772,19 +7996,14 @@
       </dsp:nvSpPr>
       <dsp:spPr>
         <a:xfrm>
-          <a:off x="963000" y="1224323"/>
-          <a:ext cx="110235" cy="110235"/>
+          <a:off x="913690" y="1373826"/>
+          <a:ext cx="105422" cy="105422"/>
         </a:xfrm>
         <a:prstGeom prst="ellipse">
           <a:avLst/>
         </a:prstGeom>
         <a:solidFill>
-          <a:schemeClr val="accent3">
-            <a:hueOff val="38"/>
-            <a:satOff val="-13962"/>
-            <a:lumOff val="-3268"/>
-            <a:alphaOff val="0"/>
-          </a:schemeClr>
+          <a:srgbClr val="0070C0"/>
         </a:solidFill>
         <a:ln>
           <a:noFill/>
@@ -7818,19 +8037,14 @@
       </dsp:nvSpPr>
       <dsp:spPr>
         <a:xfrm>
-          <a:off x="1117330" y="1301488"/>
-          <a:ext cx="173227" cy="173227"/>
+          <a:off x="1061282" y="1447621"/>
+          <a:ext cx="165663" cy="165663"/>
         </a:xfrm>
         <a:prstGeom prst="ellipse">
           <a:avLst/>
         </a:prstGeom>
         <a:solidFill>
-          <a:schemeClr val="accent3">
-            <a:hueOff val="46"/>
-            <a:satOff val="-16754"/>
-            <a:lumOff val="-3922"/>
-            <a:alphaOff val="0"/>
-          </a:schemeClr>
+          <a:srgbClr val="0070C0"/>
         </a:solidFill>
         <a:ln>
           <a:noFill/>
@@ -7864,19 +8078,14 @@
       </dsp:nvSpPr>
       <dsp:spPr>
         <a:xfrm>
-          <a:off x="1333392" y="1471251"/>
-          <a:ext cx="110235" cy="110235"/>
+          <a:off x="1267909" y="1609972"/>
+          <a:ext cx="105422" cy="105422"/>
         </a:xfrm>
         <a:prstGeom prst="ellipse">
           <a:avLst/>
         </a:prstGeom>
         <a:solidFill>
-          <a:schemeClr val="accent3">
-            <a:hueOff val="53"/>
-            <a:satOff val="-19546"/>
-            <a:lumOff val="-4576"/>
-            <a:alphaOff val="0"/>
-          </a:schemeClr>
+          <a:srgbClr val="0070C0"/>
         </a:solidFill>
         <a:ln>
           <a:noFill/>
@@ -7910,19 +8119,14 @@
       </dsp:nvSpPr>
       <dsp:spPr>
         <a:xfrm>
-          <a:off x="1425990" y="1641014"/>
-          <a:ext cx="110235" cy="110235"/>
+          <a:off x="1356464" y="1772322"/>
+          <a:ext cx="105422" cy="105422"/>
         </a:xfrm>
         <a:prstGeom prst="ellipse">
           <a:avLst/>
         </a:prstGeom>
         <a:solidFill>
-          <a:schemeClr val="accent3">
-            <a:hueOff val="61"/>
-            <a:satOff val="-22339"/>
-            <a:lumOff val="-5229"/>
-            <a:alphaOff val="0"/>
-          </a:schemeClr>
+          <a:srgbClr val="0070C0"/>
         </a:solidFill>
         <a:ln>
           <a:noFill/>
@@ -7956,19 +8160,14 @@
       </dsp:nvSpPr>
       <dsp:spPr>
         <a:xfrm>
-          <a:off x="623473" y="1316921"/>
-          <a:ext cx="283463" cy="283463"/>
+          <a:off x="588989" y="1462380"/>
+          <a:ext cx="271086" cy="271086"/>
         </a:xfrm>
         <a:prstGeom prst="ellipse">
           <a:avLst/>
         </a:prstGeom>
         <a:solidFill>
-          <a:schemeClr val="accent3">
-            <a:hueOff val="68"/>
-            <a:satOff val="-25131"/>
-            <a:lumOff val="-5883"/>
-            <a:alphaOff val="0"/>
-          </a:schemeClr>
+          <a:srgbClr val="0070C0"/>
         </a:solidFill>
         <a:ln>
           <a:noFill/>
@@ -8002,19 +8201,14 @@
       </dsp:nvSpPr>
       <dsp:spPr>
         <a:xfrm>
-          <a:off x="21586" y="1903375"/>
-          <a:ext cx="110235" cy="110235"/>
+          <a:off x="13383" y="2023227"/>
+          <a:ext cx="105422" cy="105422"/>
         </a:xfrm>
         <a:prstGeom prst="ellipse">
           <a:avLst/>
         </a:prstGeom>
         <a:solidFill>
-          <a:schemeClr val="accent3">
-            <a:hueOff val="76"/>
-            <a:satOff val="-27923"/>
-            <a:lumOff val="-6537"/>
-            <a:alphaOff val="0"/>
-          </a:schemeClr>
+          <a:srgbClr val="0070C0"/>
         </a:solidFill>
         <a:ln>
           <a:noFill/>
@@ -8048,19 +8242,14 @@
       </dsp:nvSpPr>
       <dsp:spPr>
         <a:xfrm>
-          <a:off x="114184" y="2042272"/>
-          <a:ext cx="173227" cy="173227"/>
+          <a:off x="101938" y="2156060"/>
+          <a:ext cx="165663" cy="165663"/>
         </a:xfrm>
         <a:prstGeom prst="ellipse">
           <a:avLst/>
         </a:prstGeom>
         <a:solidFill>
-          <a:schemeClr val="accent3">
-            <a:hueOff val="84"/>
-            <a:satOff val="-30716"/>
-            <a:lumOff val="-7190"/>
-            <a:alphaOff val="0"/>
-          </a:schemeClr>
+          <a:srgbClr val="0070C0"/>
         </a:solidFill>
         <a:ln>
           <a:noFill/>
@@ -8094,19 +8283,14 @@
       </dsp:nvSpPr>
       <dsp:spPr>
         <a:xfrm>
-          <a:off x="345679" y="2165737"/>
-          <a:ext cx="251967" cy="251967"/>
+          <a:off x="323325" y="2274133"/>
+          <a:ext cx="240965" cy="240965"/>
         </a:xfrm>
         <a:prstGeom prst="ellipse">
           <a:avLst/>
         </a:prstGeom>
         <a:solidFill>
-          <a:schemeClr val="accent3">
-            <a:hueOff val="91"/>
-            <a:satOff val="-33508"/>
-            <a:lumOff val="-7844"/>
-            <a:alphaOff val="0"/>
-          </a:schemeClr>
+          <a:srgbClr val="0070C0"/>
         </a:solidFill>
         <a:ln>
           <a:noFill/>
@@ -8140,19 +8324,14 @@
       </dsp:nvSpPr>
       <dsp:spPr>
         <a:xfrm>
-          <a:off x="669772" y="2366366"/>
-          <a:ext cx="110235" cy="110235"/>
+          <a:off x="633267" y="2466001"/>
+          <a:ext cx="105422" cy="105422"/>
         </a:xfrm>
         <a:prstGeom prst="ellipse">
           <a:avLst/>
         </a:prstGeom>
         <a:solidFill>
-          <a:schemeClr val="accent3">
-            <a:hueOff val="99"/>
-            <a:satOff val="-36300"/>
-            <a:lumOff val="-8498"/>
-            <a:alphaOff val="0"/>
-          </a:schemeClr>
+          <a:srgbClr val="0070C0"/>
         </a:solidFill>
         <a:ln>
           <a:noFill/>
@@ -8186,19 +8365,14 @@
       </dsp:nvSpPr>
       <dsp:spPr>
         <a:xfrm>
-          <a:off x="731505" y="2165737"/>
-          <a:ext cx="173227" cy="173227"/>
+          <a:off x="692303" y="2274133"/>
+          <a:ext cx="165663" cy="165663"/>
         </a:xfrm>
         <a:prstGeom prst="ellipse">
           <a:avLst/>
         </a:prstGeom>
         <a:solidFill>
-          <a:schemeClr val="accent3">
-            <a:hueOff val="107"/>
-            <a:satOff val="-39093"/>
-            <a:lumOff val="-9151"/>
-            <a:alphaOff val="0"/>
-          </a:schemeClr>
+          <a:srgbClr val="0070C0"/>
         </a:solidFill>
         <a:ln>
           <a:noFill/>
@@ -8232,19 +8406,14 @@
       </dsp:nvSpPr>
       <dsp:spPr>
         <a:xfrm>
-          <a:off x="885835" y="2381799"/>
-          <a:ext cx="110235" cy="110235"/>
+          <a:off x="839895" y="2480761"/>
+          <a:ext cx="105422" cy="105422"/>
         </a:xfrm>
         <a:prstGeom prst="ellipse">
           <a:avLst/>
         </a:prstGeom>
         <a:solidFill>
-          <a:schemeClr val="accent3">
-            <a:hueOff val="114"/>
-            <a:satOff val="-41885"/>
-            <a:lumOff val="-9805"/>
-            <a:alphaOff val="0"/>
-          </a:schemeClr>
+          <a:srgbClr val="0070C0"/>
         </a:solidFill>
         <a:ln>
           <a:noFill/>
@@ -8278,19 +8447,14 @@
       </dsp:nvSpPr>
       <dsp:spPr>
         <a:xfrm>
-          <a:off x="1024732" y="2134871"/>
-          <a:ext cx="251967" cy="251967"/>
+          <a:off x="972727" y="2244614"/>
+          <a:ext cx="240965" cy="240965"/>
         </a:xfrm>
         <a:prstGeom prst="ellipse">
           <a:avLst/>
         </a:prstGeom>
         <a:solidFill>
-          <a:schemeClr val="accent3">
-            <a:hueOff val="122"/>
-            <a:satOff val="-44677"/>
-            <a:lumOff val="-10459"/>
-            <a:alphaOff val="0"/>
-          </a:schemeClr>
+          <a:srgbClr val="0070C0"/>
         </a:solidFill>
         <a:ln>
           <a:noFill/>
@@ -8324,19 +8488,14 @@
       </dsp:nvSpPr>
       <dsp:spPr>
         <a:xfrm>
-          <a:off x="1364258" y="2073138"/>
-          <a:ext cx="173227" cy="173227"/>
+          <a:off x="1297428" y="2185578"/>
+          <a:ext cx="165663" cy="165663"/>
         </a:xfrm>
         <a:prstGeom prst="ellipse">
           <a:avLst/>
         </a:prstGeom>
         <a:solidFill>
-          <a:schemeClr val="accent3">
-            <a:hueOff val="129"/>
-            <a:satOff val="-47470"/>
-            <a:lumOff val="-11112"/>
-            <a:alphaOff val="0"/>
-          </a:schemeClr>
+          <a:srgbClr val="0070C0"/>
         </a:solidFill>
         <a:ln>
           <a:noFill/>
@@ -8370,8 +8529,8 @@
       </dsp:nvSpPr>
       <dsp:spPr>
         <a:xfrm>
-          <a:off x="1537486" y="1347530"/>
-          <a:ext cx="508745" cy="971249"/>
+          <a:off x="1463091" y="1491653"/>
+          <a:ext cx="486530" cy="928840"/>
         </a:xfrm>
         <a:prstGeom prst="chevron">
           <a:avLst>
@@ -8379,12 +8538,7 @@
           </a:avLst>
         </a:prstGeom>
         <a:solidFill>
-          <a:schemeClr val="accent3">
-            <a:hueOff val="0"/>
-            <a:satOff val="0"/>
-            <a:lumOff val="0"/>
-            <a:alphaOff val="0"/>
-          </a:schemeClr>
+          <a:srgbClr val="0070C0"/>
         </a:solidFill>
         <a:ln>
           <a:noFill/>
@@ -8418,8 +8572,8 @@
       </dsp:nvSpPr>
       <dsp:spPr>
         <a:xfrm>
-          <a:off x="2046231" y="1348002"/>
-          <a:ext cx="1387486" cy="971240"/>
+          <a:off x="1949622" y="1492104"/>
+          <a:ext cx="1326902" cy="928831"/>
         </a:xfrm>
         <a:prstGeom prst="rect">
           <a:avLst/>
@@ -8475,8 +8629,8 @@
         </a:p>
       </dsp:txBody>
       <dsp:txXfrm>
-        <a:off x="2046231" y="1348002"/>
-        <a:ext cx="1387486" cy="971240"/>
+        <a:off x="1949622" y="1492104"/>
+        <a:ext cx="1326902" cy="928831"/>
       </dsp:txXfrm>
     </dsp:sp>
     <dsp:sp modelId="{5510BB7F-E98E-4475-A087-C6391C783681}">
@@ -8486,8 +8640,8 @@
       </dsp:nvSpPr>
       <dsp:spPr>
         <a:xfrm>
-          <a:off x="3266686" y="1376706"/>
-          <a:ext cx="508745" cy="971249"/>
+          <a:off x="3116786" y="1519556"/>
+          <a:ext cx="486530" cy="928840"/>
         </a:xfrm>
         <a:prstGeom prst="chevron">
           <a:avLst>
@@ -8495,12 +8649,7 @@
           </a:avLst>
         </a:prstGeom>
         <a:solidFill>
-          <a:schemeClr val="accent3">
-            <a:hueOff val="46"/>
-            <a:satOff val="-16754"/>
-            <a:lumOff val="-3922"/>
-            <a:alphaOff val="0"/>
-          </a:schemeClr>
+          <a:srgbClr val="0070C0"/>
         </a:solidFill>
         <a:ln>
           <a:noFill/>
@@ -8534,8 +8683,8 @@
       </dsp:nvSpPr>
       <dsp:spPr>
         <a:xfrm>
-          <a:off x="3942463" y="1348002"/>
-          <a:ext cx="1387486" cy="971240"/>
+          <a:off x="3763055" y="1492104"/>
+          <a:ext cx="1326902" cy="928831"/>
         </a:xfrm>
         <a:prstGeom prst="rect">
           <a:avLst/>
@@ -8578,21 +8727,21 @@
           <a:r>
             <a:rPr lang="pt-BR" sz="1600" b="1" kern="1200" dirty="0" smtClean="0">
               <a:solidFill>
-                <a:srgbClr val="7030A0"/>
+                <a:srgbClr val="FFC000"/>
               </a:solidFill>
             </a:rPr>
             <a:t>Serviço ativo</a:t>
           </a:r>
           <a:endParaRPr lang="pt-BR" sz="1600" b="1" kern="1200" dirty="0">
             <a:solidFill>
-              <a:srgbClr val="7030A0"/>
+              <a:srgbClr val="FFC000"/>
             </a:solidFill>
           </a:endParaRPr>
         </a:p>
       </dsp:txBody>
       <dsp:txXfrm>
-        <a:off x="3942463" y="1348002"/>
-        <a:ext cx="1387486" cy="971240"/>
+        <a:off x="3763055" y="1492104"/>
+        <a:ext cx="1326902" cy="928831"/>
       </dsp:txXfrm>
     </dsp:sp>
     <dsp:sp modelId="{C5065143-8AF7-4AE9-A44E-5E4DF178427E}">
@@ -8602,8 +8751,8 @@
       </dsp:nvSpPr>
       <dsp:spPr>
         <a:xfrm>
-          <a:off x="5138895" y="1376706"/>
-          <a:ext cx="508745" cy="971249"/>
+          <a:off x="4907245" y="1519556"/>
+          <a:ext cx="486530" cy="928840"/>
         </a:xfrm>
         <a:prstGeom prst="chevron">
           <a:avLst>
@@ -8611,12 +8760,7 @@
           </a:avLst>
         </a:prstGeom>
         <a:solidFill>
-          <a:schemeClr val="accent3">
-            <a:hueOff val="91"/>
-            <a:satOff val="-33508"/>
-            <a:lumOff val="-7844"/>
-            <a:alphaOff val="0"/>
-          </a:schemeClr>
+          <a:srgbClr val="FFC000"/>
         </a:solidFill>
         <a:ln>
           <a:noFill/>
@@ -8650,8 +8794,8 @@
       </dsp:nvSpPr>
       <dsp:spPr>
         <a:xfrm>
-          <a:off x="5838695" y="1348002"/>
-          <a:ext cx="1387486" cy="971240"/>
+          <a:off x="5576488" y="1492104"/>
+          <a:ext cx="1326902" cy="928831"/>
         </a:xfrm>
         <a:prstGeom prst="rect">
           <a:avLst/>
@@ -8694,21 +8838,21 @@
           <a:r>
             <a:rPr lang="pt-BR" sz="1600" b="1" kern="1200" dirty="0" smtClean="0">
               <a:solidFill>
-                <a:srgbClr val="7030A0"/>
+                <a:srgbClr val="00B050"/>
               </a:solidFill>
             </a:rPr>
             <a:t>Regularidade de atividades acadêmicas</a:t>
           </a:r>
           <a:endParaRPr lang="pt-BR" sz="1600" b="1" kern="1200" dirty="0">
             <a:solidFill>
-              <a:srgbClr val="7030A0"/>
+              <a:srgbClr val="00B050"/>
             </a:solidFill>
           </a:endParaRPr>
         </a:p>
       </dsp:txBody>
       <dsp:txXfrm>
-        <a:off x="5838695" y="1348002"/>
-        <a:ext cx="1387486" cy="971240"/>
+        <a:off x="5576488" y="1492104"/>
+        <a:ext cx="1326902" cy="928831"/>
       </dsp:txXfrm>
     </dsp:sp>
     <dsp:sp modelId="{B9E275C6-562A-432D-BC53-BE29329C92C7}">
@@ -8718,8 +8862,8 @@
       </dsp:nvSpPr>
       <dsp:spPr>
         <a:xfrm>
-          <a:off x="7226181" y="1347530"/>
-          <a:ext cx="508745" cy="971249"/>
+          <a:off x="6903390" y="1491653"/>
+          <a:ext cx="486530" cy="928840"/>
         </a:xfrm>
         <a:prstGeom prst="chevron">
           <a:avLst>
@@ -8727,12 +8871,7 @@
           </a:avLst>
         </a:prstGeom>
         <a:solidFill>
-          <a:schemeClr val="accent3">
-            <a:hueOff val="137"/>
-            <a:satOff val="-50262"/>
-            <a:lumOff val="-11766"/>
-            <a:alphaOff val="0"/>
-          </a:schemeClr>
+          <a:srgbClr val="00B050"/>
         </a:solidFill>
         <a:ln>
           <a:noFill/>
@@ -8766,19 +8905,14 @@
       </dsp:nvSpPr>
       <dsp:spPr>
         <a:xfrm>
-          <a:off x="7838988" y="1278628"/>
-          <a:ext cx="1179363" cy="1179363"/>
+          <a:off x="7489438" y="1425759"/>
+          <a:ext cx="1127866" cy="1127866"/>
         </a:xfrm>
         <a:prstGeom prst="ellipse">
           <a:avLst/>
         </a:prstGeom>
         <a:solidFill>
-          <a:schemeClr val="accent3">
-            <a:hueOff val="137"/>
-            <a:satOff val="-50262"/>
-            <a:lumOff val="-11766"/>
-            <a:alphaOff val="0"/>
-          </a:schemeClr>
+          <a:srgbClr val="00B050"/>
         </a:solidFill>
         <a:ln>
           <a:noFill/>
@@ -8859,8 +8993,8 @@
         </a:p>
       </dsp:txBody>
       <dsp:txXfrm>
-        <a:off x="8011702" y="1451342"/>
-        <a:ext cx="833935" cy="833935"/>
+        <a:off x="7654610" y="1590931"/>
+        <a:ext cx="797522" cy="797522"/>
       </dsp:txXfrm>
     </dsp:sp>
     <dsp:sp modelId="{E051B2E9-E0F1-4F67-B203-7076EBD6126A}">
@@ -8870,8 +9004,8 @@
       </dsp:nvSpPr>
       <dsp:spPr>
         <a:xfrm>
-          <a:off x="7734926" y="2537319"/>
-          <a:ext cx="1387486" cy="855616"/>
+          <a:off x="7389921" y="2629490"/>
+          <a:ext cx="1326902" cy="818256"/>
         </a:xfrm>
         <a:prstGeom prst="rect">
           <a:avLst/>
@@ -8924,8 +9058,8 @@
         </a:p>
       </dsp:txBody>
       <dsp:txXfrm>
-        <a:off x="7734926" y="2537319"/>
-        <a:ext cx="1387486" cy="855616"/>
+        <a:off x="7389921" y="2629490"/>
+        <a:ext cx="1326902" cy="818256"/>
       </dsp:txXfrm>
     </dsp:sp>
   </dsp:spTree>
@@ -8950,10 +9084,8 @@
           <a:off x="282441" y="1915"/>
           <a:ext cx="1900997" cy="1942300"/>
         </a:xfrm>
-        <a:prstGeom prst="roundRect">
-          <a:avLst>
-            <a:gd name="adj" fmla="val 10000"/>
-          </a:avLst>
+        <a:prstGeom prst="ellipse">
+          <a:avLst/>
         </a:prstGeom>
         <a:blipFill rotWithShape="0">
           <a:blip xmlns:r="http://schemas.openxmlformats.org/officeDocument/2006/relationships" r:embed="rId1"/>
@@ -9013,8 +9145,8 @@
         </a:p>
       </dsp:txBody>
       <dsp:txXfrm>
-        <a:off x="338119" y="57593"/>
-        <a:ext cx="1789641" cy="1830944"/>
+        <a:off x="560836" y="286358"/>
+        <a:ext cx="1344207" cy="1373414"/>
       </dsp:txXfrm>
     </dsp:sp>
     <dsp:sp modelId="{40EC9B65-825A-4CFD-9FF3-3094A2D18072}">
@@ -9419,9 +9551,7 @@
           <a:ext cx="1292030" cy="1190867"/>
         </a:xfrm>
         <a:prstGeom prst="roundRect">
-          <a:avLst>
-            <a:gd name="adj" fmla="val 10000"/>
-          </a:avLst>
+          <a:avLst/>
         </a:prstGeom>
         <a:blipFill rotWithShape="0">
           <a:blip xmlns:r="http://schemas.openxmlformats.org/officeDocument/2006/relationships" r:embed="rId4"/>
@@ -9457,12 +9587,12 @@
         </a:fontRef>
       </dsp:style>
       <dsp:txBody>
-        <a:bodyPr spcFirstLastPara="0" vert="horz" wrap="square" lIns="40640" tIns="40640" rIns="40640" bIns="40640" numCol="1" spcCol="1270" anchor="ctr" anchorCtr="0">
+        <a:bodyPr spcFirstLastPara="0" vert="horz" wrap="square" lIns="40005" tIns="40005" rIns="40005" bIns="40005" numCol="1" spcCol="1270" anchor="ctr" anchorCtr="0">
           <a:noAutofit/>
         </a:bodyPr>
         <a:lstStyle/>
         <a:p>
-          <a:pPr lvl="0" algn="ctr" defTabSz="2844800">
+          <a:pPr lvl="0" algn="ctr" defTabSz="2800350">
             <a:lnSpc>
               <a:spcPct val="90000"/>
             </a:lnSpc>
@@ -9473,7 +9603,14 @@
               <a:spcPct val="35000"/>
             </a:spcAft>
           </a:pPr>
-          <a:endParaRPr lang="pt-BR" sz="6400" b="1" kern="1200" dirty="0">
+          <a:endParaRPr lang="pt-BR" sz="6300" b="1" kern="1200" dirty="0">
+            <a:ln>
+              <a:solidFill>
+                <a:schemeClr val="bg1">
+                  <a:lumMod val="75000"/>
+                </a:schemeClr>
+              </a:solidFill>
+            </a:ln>
             <a:solidFill>
               <a:srgbClr val="FF0000"/>
             </a:solidFill>
@@ -9481,8 +9618,8 @@
         </a:p>
       </dsp:txBody>
       <dsp:txXfrm>
-        <a:off x="7203279" y="411553"/>
-        <a:ext cx="1222272" cy="1121109"/>
+        <a:off x="7226533" y="434807"/>
+        <a:ext cx="1175764" cy="1074601"/>
       </dsp:txXfrm>
     </dsp:sp>
   </dsp:spTree>
@@ -17447,7 +17584,7 @@
           <a:p>
             <a:fld id="{3F5D9F91-5035-469D-968F-FE3C304D0282}" type="datetimeFigureOut">
               <a:rPr lang="pt-BR" smtClean="0"/>
-              <a:t>19/11/2018</a:t>
+              <a:t>22/11/2018</a:t>
             </a:fld>
             <a:endParaRPr lang="pt-BR"/>
           </a:p>
@@ -18259,7 +18396,7 @@
           <a:p>
             <a:fld id="{6170734A-4B5A-4F3B-B573-1E93A2DEC51B}" type="datetimeFigureOut">
               <a:rPr lang="pt-BR" smtClean="0"/>
-              <a:t>19/11/2018</a:t>
+              <a:t>22/11/2018</a:t>
             </a:fld>
             <a:endParaRPr lang="pt-BR"/>
           </a:p>
@@ -18424,7 +18561,7 @@
           <a:p>
             <a:fld id="{6170734A-4B5A-4F3B-B573-1E93A2DEC51B}" type="datetimeFigureOut">
               <a:rPr lang="pt-BR" smtClean="0"/>
-              <a:t>19/11/2018</a:t>
+              <a:t>22/11/2018</a:t>
             </a:fld>
             <a:endParaRPr lang="pt-BR"/>
           </a:p>
@@ -18599,7 +18736,7 @@
           <a:p>
             <a:fld id="{6170734A-4B5A-4F3B-B573-1E93A2DEC51B}" type="datetimeFigureOut">
               <a:rPr lang="pt-BR" smtClean="0"/>
-              <a:t>19/11/2018</a:t>
+              <a:t>22/11/2018</a:t>
             </a:fld>
             <a:endParaRPr lang="pt-BR"/>
           </a:p>
@@ -18782,7 +18919,7 @@
           <a:p>
             <a:fld id="{6170734A-4B5A-4F3B-B573-1E93A2DEC51B}" type="datetimeFigureOut">
               <a:rPr lang="pt-BR" smtClean="0"/>
-              <a:t>19/11/2018</a:t>
+              <a:t>22/11/2018</a:t>
             </a:fld>
             <a:endParaRPr lang="pt-BR"/>
           </a:p>
@@ -19044,7 +19181,7 @@
           <a:p>
             <a:fld id="{6170734A-4B5A-4F3B-B573-1E93A2DEC51B}" type="datetimeFigureOut">
               <a:rPr lang="pt-BR" smtClean="0"/>
-              <a:t>19/11/2018</a:t>
+              <a:t>22/11/2018</a:t>
             </a:fld>
             <a:endParaRPr lang="pt-BR"/>
           </a:p>
@@ -19392,7 +19529,7 @@
           <a:p>
             <a:fld id="{6170734A-4B5A-4F3B-B573-1E93A2DEC51B}" type="datetimeFigureOut">
               <a:rPr lang="pt-BR" smtClean="0"/>
-              <a:t>19/11/2018</a:t>
+              <a:t>22/11/2018</a:t>
             </a:fld>
             <a:endParaRPr lang="pt-BR"/>
           </a:p>
@@ -19700,7 +19837,7 @@
           <a:p>
             <a:fld id="{6170734A-4B5A-4F3B-B573-1E93A2DEC51B}" type="datetimeFigureOut">
               <a:rPr lang="pt-BR" smtClean="0"/>
-              <a:t>19/11/2018</a:t>
+              <a:t>22/11/2018</a:t>
             </a:fld>
             <a:endParaRPr lang="pt-BR"/>
           </a:p>
@@ -19927,7 +20064,7 @@
           <a:p>
             <a:fld id="{6170734A-4B5A-4F3B-B573-1E93A2DEC51B}" type="datetimeFigureOut">
               <a:rPr lang="pt-BR" smtClean="0"/>
-              <a:t>19/11/2018</a:t>
+              <a:t>22/11/2018</a:t>
             </a:fld>
             <a:endParaRPr lang="pt-BR"/>
           </a:p>
@@ -20017,7 +20154,7 @@
           <a:p>
             <a:fld id="{6170734A-4B5A-4F3B-B573-1E93A2DEC51B}" type="datetimeFigureOut">
               <a:rPr lang="pt-BR" smtClean="0"/>
-              <a:t>19/11/2018</a:t>
+              <a:t>22/11/2018</a:t>
             </a:fld>
             <a:endParaRPr lang="pt-BR"/>
           </a:p>
@@ -20305,7 +20442,7 @@
           <a:p>
             <a:fld id="{6170734A-4B5A-4F3B-B573-1E93A2DEC51B}" type="datetimeFigureOut">
               <a:rPr lang="pt-BR" smtClean="0"/>
-              <a:t>19/11/2018</a:t>
+              <a:t>22/11/2018</a:t>
             </a:fld>
             <a:endParaRPr lang="pt-BR"/>
           </a:p>
@@ -20574,7 +20711,7 @@
           <a:p>
             <a:fld id="{6170734A-4B5A-4F3B-B573-1E93A2DEC51B}" type="datetimeFigureOut">
               <a:rPr lang="pt-BR" smtClean="0"/>
-              <a:t>19/11/2018</a:t>
+              <a:t>22/11/2018</a:t>
             </a:fld>
             <a:endParaRPr lang="pt-BR"/>
           </a:p>
@@ -20784,7 +20921,7 @@
           <a:p>
             <a:fld id="{6170734A-4B5A-4F3B-B573-1E93A2DEC51B}" type="datetimeFigureOut">
               <a:rPr lang="pt-BR" smtClean="0"/>
-              <a:t>19/11/2018</a:t>
+              <a:t>22/11/2018</a:t>
             </a:fld>
             <a:endParaRPr lang="pt-BR"/>
           </a:p>
@@ -21889,7 +22026,6 @@
               <a:rPr lang="pt-BR" b="1" dirty="0" smtClean="0"/>
               <a:t> Server</a:t>
             </a:r>
-            <a:endParaRPr lang="pt-BR" b="1" dirty="0" smtClean="0"/>
           </a:p>
           <a:p>
             <a:pPr>
@@ -22266,44 +22402,15 @@
           <a:chExt cx="0" cy="0"/>
         </a:xfrm>
       </p:grpSpPr>
-      <p:sp>
-        <p:nvSpPr>
-          <p:cNvPr id="2" name="Título 1"/>
-          <p:cNvSpPr>
-            <a:spLocks noGrp="1"/>
-          </p:cNvSpPr>
-          <p:nvPr>
-            <p:ph type="title"/>
-          </p:nvPr>
-        </p:nvSpPr>
-        <p:spPr>
-          <a:xfrm>
-            <a:off x="827584" y="123986"/>
-            <a:ext cx="8089654" cy="859194"/>
-          </a:xfrm>
-        </p:spPr>
-        <p:txBody>
-          <a:bodyPr/>
-          <a:lstStyle/>
-          <a:p>
-            <a:pPr algn="l"/>
-            <a:r>
-              <a:rPr lang="pt-BR" sz="3200" dirty="0" smtClean="0"/>
-              <a:t>Home usuário</a:t>
-            </a:r>
-            <a:endParaRPr lang="pt-BR" sz="3200" dirty="0"/>
-          </a:p>
-        </p:txBody>
-      </p:sp>
       <p:pic>
         <p:nvPicPr>
-          <p:cNvPr id="4" name="Picture 2" descr="https://cdn-images-1.medium.com/max/600/1*YHKQVfSqFafrXvGcc5wUuQ.png"/>
+          <p:cNvPr id="1026" name="Picture 2"/>
           <p:cNvPicPr>
             <a:picLocks noChangeAspect="1" noChangeArrowheads="1"/>
           </p:cNvPicPr>
           <p:nvPr/>
         </p:nvPicPr>
-        <p:blipFill rotWithShape="1">
+        <p:blipFill>
           <a:blip r:embed="rId2">
             <a:extLst>
               <a:ext uri="{28A0092B-C50C-407E-A947-70E740481C1C}">
@@ -22311,57 +22418,15 @@
               </a:ext>
             </a:extLst>
           </a:blip>
-          <a:srcRect b="11346"/>
-          <a:stretch/>
+          <a:srcRect/>
+          <a:stretch>
+            <a:fillRect/>
+          </a:stretch>
         </p:blipFill>
         <p:spPr bwMode="auto">
           <a:xfrm>
-            <a:off x="0" y="-60521"/>
-            <a:ext cx="827584" cy="614104"/>
-          </a:xfrm>
-          <a:prstGeom prst="rect">
-            <a:avLst/>
-          </a:prstGeom>
-          <a:ln>
-            <a:noFill/>
-          </a:ln>
-          <a:effectLst>
-            <a:softEdge rad="112500"/>
-          </a:effectLst>
-          <a:extLst>
-            <a:ext uri="{909E8E84-426E-40DD-AFC4-6F175D3DCCD1}">
-              <a14:hiddenFill xmlns:a14="http://schemas.microsoft.com/office/drawing/2010/main">
-                <a:solidFill>
-                  <a:srgbClr val="FFFFFF"/>
-                </a:solidFill>
-              </a14:hiddenFill>
-            </a:ext>
-          </a:extLst>
-        </p:spPr>
-      </p:pic>
-      <p:pic>
-        <p:nvPicPr>
-          <p:cNvPr id="5" name="Picture 2"/>
-          <p:cNvPicPr>
-            <a:picLocks noChangeAspect="1" noChangeArrowheads="1"/>
-          </p:cNvPicPr>
-          <p:nvPr/>
-        </p:nvPicPr>
-        <p:blipFill rotWithShape="1">
-          <a:blip r:embed="rId3">
-            <a:extLst>
-              <a:ext uri="{28A0092B-C50C-407E-A947-70E740481C1C}">
-                <a14:useLocalDpi xmlns:a14="http://schemas.microsoft.com/office/drawing/2010/main" val="0"/>
-              </a:ext>
-            </a:extLst>
-          </a:blip>
-          <a:srcRect r="42883"/>
-          <a:stretch/>
-        </p:blipFill>
-        <p:spPr bwMode="auto">
-          <a:xfrm>
-            <a:off x="260255" y="980728"/>
-            <a:ext cx="8776241" cy="5654784"/>
+            <a:off x="242942" y="955158"/>
+            <a:ext cx="8782050" cy="5657850"/>
           </a:xfrm>
           <a:prstGeom prst="rect">
             <a:avLst/>
@@ -22404,50 +22469,147 @@
       </p:pic>
       <p:sp>
         <p:nvSpPr>
-          <p:cNvPr id="6" name="Elipse 5"/>
-          <p:cNvSpPr/>
-          <p:nvPr/>
+          <p:cNvPr id="2" name="Título 1"/>
+          <p:cNvSpPr>
+            <a:spLocks noGrp="1"/>
+          </p:cNvSpPr>
+          <p:nvPr>
+            <p:ph type="title"/>
+          </p:nvPr>
         </p:nvSpPr>
         <p:spPr>
           <a:xfrm>
-            <a:off x="6228184" y="4869160"/>
-            <a:ext cx="3384376" cy="1988840"/>
+            <a:off x="827584" y="123986"/>
+            <a:ext cx="8089654" cy="859194"/>
           </a:xfrm>
-          <a:prstGeom prst="ellipse">
-            <a:avLst/>
-          </a:prstGeom>
-          <a:noFill/>
-          <a:ln>
-            <a:solidFill>
-              <a:srgbClr val="C00000"/>
-            </a:solidFill>
-          </a:ln>
         </p:spPr>
-        <p:style>
-          <a:lnRef idx="2">
-            <a:schemeClr val="accent1">
-              <a:shade val="50000"/>
-            </a:schemeClr>
-          </a:lnRef>
-          <a:fillRef idx="1">
-            <a:schemeClr val="accent1"/>
-          </a:fillRef>
-          <a:effectRef idx="0">
-            <a:schemeClr val="accent1"/>
-          </a:effectRef>
-          <a:fontRef idx="minor">
-            <a:schemeClr val="lt1"/>
-          </a:fontRef>
-        </p:style>
         <p:txBody>
-          <a:bodyPr rtlCol="0" anchor="ctr"/>
+          <a:bodyPr/>
           <a:lstStyle/>
           <a:p>
-            <a:pPr algn="ctr"/>
-            <a:endParaRPr lang="pt-BR"/>
+            <a:pPr algn="l"/>
+            <a:r>
+              <a:rPr lang="pt-BR" sz="3200" dirty="0" smtClean="0"/>
+              <a:t>Home usuário</a:t>
+            </a:r>
+            <a:endParaRPr lang="pt-BR" sz="3200" dirty="0"/>
           </a:p>
         </p:txBody>
       </p:sp>
+      <p:pic>
+        <p:nvPicPr>
+          <p:cNvPr id="4" name="Picture 2" descr="https://cdn-images-1.medium.com/max/600/1*YHKQVfSqFafrXvGcc5wUuQ.png"/>
+          <p:cNvPicPr>
+            <a:picLocks noChangeAspect="1" noChangeArrowheads="1"/>
+          </p:cNvPicPr>
+          <p:nvPr/>
+        </p:nvPicPr>
+        <p:blipFill rotWithShape="1">
+          <a:blip r:embed="rId3">
+            <a:extLst>
+              <a:ext uri="{28A0092B-C50C-407E-A947-70E740481C1C}">
+                <a14:useLocalDpi xmlns:a14="http://schemas.microsoft.com/office/drawing/2010/main" val="0"/>
+              </a:ext>
+            </a:extLst>
+          </a:blip>
+          <a:srcRect b="11346"/>
+          <a:stretch/>
+        </p:blipFill>
+        <p:spPr bwMode="auto">
+          <a:xfrm>
+            <a:off x="0" y="-60521"/>
+            <a:ext cx="827584" cy="614104"/>
+          </a:xfrm>
+          <a:prstGeom prst="rect">
+            <a:avLst/>
+          </a:prstGeom>
+          <a:ln>
+            <a:noFill/>
+          </a:ln>
+          <a:effectLst>
+            <a:softEdge rad="112500"/>
+          </a:effectLst>
+          <a:extLst>
+            <a:ext uri="{909E8E84-426E-40DD-AFC4-6F175D3DCCD1}">
+              <a14:hiddenFill xmlns:a14="http://schemas.microsoft.com/office/drawing/2010/main">
+                <a:solidFill>
+                  <a:srgbClr val="FFFFFF"/>
+                </a:solidFill>
+              </a14:hiddenFill>
+            </a:ext>
+          </a:extLst>
+        </p:spPr>
+      </p:pic>
+      <p:pic>
+        <p:nvPicPr>
+          <p:cNvPr id="7" name="Picture 2"/>
+          <p:cNvPicPr>
+            <a:picLocks noChangeAspect="1" noChangeArrowheads="1"/>
+          </p:cNvPicPr>
+          <p:nvPr/>
+        </p:nvPicPr>
+        <p:blipFill rotWithShape="1">
+          <a:blip r:embed="rId4">
+            <a:duotone>
+              <a:prstClr val="black"/>
+              <a:schemeClr val="accent3">
+                <a:tint val="45000"/>
+                <a:satMod val="400000"/>
+              </a:schemeClr>
+            </a:duotone>
+            <a:extLst>
+              <a:ext uri="{28A0092B-C50C-407E-A947-70E740481C1C}">
+                <a14:useLocalDpi xmlns:a14="http://schemas.microsoft.com/office/drawing/2010/main" val="0"/>
+              </a:ext>
+            </a:extLst>
+          </a:blip>
+          <a:srcRect l="42308" t="78337" r="43300" b="6359"/>
+          <a:stretch/>
+        </p:blipFill>
+        <p:spPr bwMode="auto">
+          <a:xfrm>
+            <a:off x="3419872" y="4711120"/>
+            <a:ext cx="5491384" cy="1901887"/>
+          </a:xfrm>
+          <a:prstGeom prst="roundRect">
+            <a:avLst>
+              <a:gd name="adj" fmla="val 8594"/>
+            </a:avLst>
+          </a:prstGeom>
+          <a:solidFill>
+            <a:srgbClr val="FFFFFF">
+              <a:shade val="85000"/>
+            </a:srgbClr>
+          </a:solidFill>
+          <a:ln>
+            <a:noFill/>
+          </a:ln>
+          <a:effectLst>
+            <a:reflection blurRad="12700" stA="38000" endPos="28000" dist="5000" dir="5400000" sy="-100000" algn="bl" rotWithShape="0"/>
+          </a:effectLst>
+          <a:extLst>
+            <a:ext uri="{91240B29-F687-4F45-9708-019B960494DF}">
+              <a14:hiddenLine xmlns:a14="http://schemas.microsoft.com/office/drawing/2010/main" w="9525">
+                <a:solidFill>
+                  <a:schemeClr val="tx1"/>
+                </a:solidFill>
+                <a:miter lim="800000"/>
+                <a:headEnd/>
+                <a:tailEnd/>
+              </a14:hiddenLine>
+            </a:ext>
+            <a:ext uri="{AF507438-7753-43E0-B8FC-AC1667EBCBE1}">
+              <a14:hiddenEffects xmlns:a14="http://schemas.microsoft.com/office/drawing/2010/main">
+                <a:effectLst>
+                  <a:outerShdw dist="35921" dir="2700000" algn="ctr" rotWithShape="0">
+                    <a:schemeClr val="bg2"/>
+                  </a:outerShdw>
+                </a:effectLst>
+              </a14:hiddenEffects>
+            </a:ext>
+          </a:extLst>
+        </p:spPr>
+      </p:pic>
     </p:spTree>
     <p:extLst>
       <p:ext uri="{BB962C8B-B14F-4D97-AF65-F5344CB8AC3E}">
@@ -22461,7 +22623,78 @@
   <p:timing>
     <p:tnLst>
       <p:par>
-        <p:cTn id="1" dur="indefinite" restart="never" nodeType="tmRoot"/>
+        <p:cTn id="1" dur="indefinite" restart="never" nodeType="tmRoot">
+          <p:childTnLst>
+            <p:seq concurrent="1" nextAc="seek">
+              <p:cTn id="2" dur="indefinite" nodeType="mainSeq">
+                <p:childTnLst>
+                  <p:par>
+                    <p:cTn id="3" fill="hold">
+                      <p:stCondLst>
+                        <p:cond delay="indefinite"/>
+                        <p:cond evt="onBegin" delay="0">
+                          <p:tn val="2"/>
+                        </p:cond>
+                      </p:stCondLst>
+                      <p:childTnLst>
+                        <p:par>
+                          <p:cTn id="4" fill="hold">
+                            <p:stCondLst>
+                              <p:cond delay="0"/>
+                            </p:stCondLst>
+                            <p:childTnLst>
+                              <p:par>
+                                <p:cTn id="5" presetID="1" presetClass="entr" presetSubtype="0" fill="hold" nodeType="afterEffect">
+                                  <p:stCondLst>
+                                    <p:cond delay="5000"/>
+                                  </p:stCondLst>
+                                  <p:childTnLst>
+                                    <p:set>
+                                      <p:cBhvr>
+                                        <p:cTn id="6" dur="1" fill="hold">
+                                          <p:stCondLst>
+                                            <p:cond delay="0"/>
+                                          </p:stCondLst>
+                                        </p:cTn>
+                                        <p:tgtEl>
+                                          <p:spTgt spid="7"/>
+                                        </p:tgtEl>
+                                        <p:attrNameLst>
+                                          <p:attrName>style.visibility</p:attrName>
+                                        </p:attrNameLst>
+                                      </p:cBhvr>
+                                      <p:to>
+                                        <p:strVal val="visible"/>
+                                      </p:to>
+                                    </p:set>
+                                  </p:childTnLst>
+                                </p:cTn>
+                              </p:par>
+                            </p:childTnLst>
+                          </p:cTn>
+                        </p:par>
+                      </p:childTnLst>
+                    </p:cTn>
+                  </p:par>
+                </p:childTnLst>
+              </p:cTn>
+              <p:prevCondLst>
+                <p:cond evt="onPrev" delay="0">
+                  <p:tgtEl>
+                    <p:sldTgt/>
+                  </p:tgtEl>
+                </p:cond>
+              </p:prevCondLst>
+              <p:nextCondLst>
+                <p:cond evt="onNext" delay="0">
+                  <p:tgtEl>
+                    <p:sldTgt/>
+                  </p:tgtEl>
+                </p:cond>
+              </p:nextCondLst>
+            </p:seq>
+          </p:childTnLst>
+        </p:cTn>
       </p:par>
     </p:tnLst>
   </p:timing>
@@ -24036,15 +24269,7 @@
                   <a:schemeClr val="tx1"/>
                 </a:solidFill>
               </a:rPr>
-              <a:t>Disponibilização de </a:t>
-            </a:r>
-            <a:r>
-              <a:rPr lang="pt-BR" sz="2000" b="1" dirty="0" smtClean="0">
-                <a:solidFill>
-                  <a:schemeClr val="tx1"/>
-                </a:solidFill>
-              </a:rPr>
-              <a:t>serviços </a:t>
+              <a:t>Disponibilização de serviços </a:t>
             </a:r>
             <a:r>
               <a:rPr lang="pt-BR" sz="1200" b="1" dirty="0" smtClean="0">
@@ -24069,15 +24294,7 @@
                   <a:srgbClr val="00B050"/>
                 </a:solidFill>
               </a:rPr>
-              <a:t>Solução </a:t>
-            </a:r>
-            <a:r>
-              <a:rPr lang="pt-BR" sz="2000" b="1" dirty="0" smtClean="0">
-                <a:solidFill>
-                  <a:srgbClr val="00B050"/>
-                </a:solidFill>
-              </a:rPr>
-              <a:t>de </a:t>
+              <a:t>Solução de </a:t>
             </a:r>
             <a:r>
               <a:rPr lang="pt-BR" sz="2000" b="1" dirty="0" err="1" smtClean="0">
@@ -24093,15 +24310,7 @@
                   <a:srgbClr val="00B050"/>
                 </a:solidFill>
               </a:rPr>
-              <a:t> em </a:t>
-            </a:r>
-            <a:r>
-              <a:rPr lang="pt-BR" sz="2000" b="1" dirty="0" smtClean="0">
-                <a:solidFill>
-                  <a:srgbClr val="00B050"/>
-                </a:solidFill>
-              </a:rPr>
-              <a:t>três clicks</a:t>
+              <a:t> em três clicks</a:t>
             </a:r>
           </a:p>
           <a:p>
@@ -24272,15 +24481,7 @@
             </a:pPr>
             <a:r>
               <a:rPr lang="pt-BR" sz="2000" b="1" dirty="0" smtClean="0"/>
-              <a:t>Docentes com </a:t>
-            </a:r>
-            <a:r>
-              <a:rPr lang="pt-BR" sz="2000" b="1" dirty="0" smtClean="0"/>
-              <a:t>pouco </a:t>
-            </a:r>
-            <a:r>
-              <a:rPr lang="pt-BR" sz="2000" b="1" dirty="0" smtClean="0"/>
-              <a:t>tempo</a:t>
+              <a:t>Docentes com pouco tempo</a:t>
             </a:r>
           </a:p>
           <a:p>
@@ -24307,23 +24508,7 @@
                   <a:srgbClr val="00B050"/>
                 </a:solidFill>
               </a:rPr>
-              <a:t>Operação de sistemas </a:t>
-            </a:r>
-            <a:r>
-              <a:rPr lang="pt-BR" sz="2000" b="1" dirty="0" smtClean="0">
-                <a:solidFill>
-                  <a:srgbClr val="00B050"/>
-                </a:solidFill>
-              </a:rPr>
-              <a:t>burocráticos poucos </a:t>
-            </a:r>
-            <a:r>
-              <a:rPr lang="pt-BR" sz="2000" b="1" dirty="0" smtClean="0">
-                <a:solidFill>
-                  <a:srgbClr val="00B050"/>
-                </a:solidFill>
-              </a:rPr>
-              <a:t>interativos</a:t>
+              <a:t>Operação de sistemas burocráticos poucos interativos</a:t>
             </a:r>
           </a:p>
           <a:p>
@@ -24350,13 +24535,8 @@
             </a:pPr>
             <a:r>
               <a:rPr lang="pt-BR" sz="2000" b="1" dirty="0" smtClean="0"/>
-              <a:t>Prazos </a:t>
+              <a:t>Prazos apertados </a:t>
             </a:r>
-            <a:r>
-              <a:rPr lang="pt-BR" sz="2000" b="1" dirty="0" smtClean="0"/>
-              <a:t>apertados </a:t>
-            </a:r>
-            <a:endParaRPr lang="pt-BR" sz="2000" b="1" dirty="0" smtClean="0"/>
           </a:p>
           <a:p>
             <a:pPr marL="0" indent="0">
@@ -24902,7 +25082,7 @@
         </p:nvSpPr>
         <p:spPr>
           <a:xfrm>
-            <a:off x="2970667" y="3685051"/>
+            <a:off x="2915816" y="3685051"/>
             <a:ext cx="838691" cy="369332"/>
           </a:xfrm>
           <a:prstGeom prst="rect">
@@ -25580,9 +25760,583 @@
   <p:timing>
     <p:tnLst>
       <p:par>
-        <p:cTn id="1" dur="indefinite" restart="never" nodeType="tmRoot"/>
+        <p:cTn id="1" dur="indefinite" restart="never" nodeType="tmRoot">
+          <p:childTnLst>
+            <p:seq concurrent="1" nextAc="seek">
+              <p:cTn id="2" dur="indefinite" nodeType="mainSeq">
+                <p:childTnLst>
+                  <p:par>
+                    <p:cTn id="3" fill="hold">
+                      <p:stCondLst>
+                        <p:cond delay="indefinite"/>
+                        <p:cond evt="onBegin" delay="0">
+                          <p:tn val="2"/>
+                        </p:cond>
+                      </p:stCondLst>
+                      <p:childTnLst>
+                        <p:par>
+                          <p:cTn id="4" fill="hold">
+                            <p:stCondLst>
+                              <p:cond delay="0"/>
+                            </p:stCondLst>
+                            <p:childTnLst>
+                              <p:par>
+                                <p:cTn id="5" presetID="1" presetClass="entr" presetSubtype="0" fill="hold" grpId="0" nodeType="afterEffect">
+                                  <p:stCondLst>
+                                    <p:cond delay="2000"/>
+                                  </p:stCondLst>
+                                  <p:childTnLst>
+                                    <p:set>
+                                      <p:cBhvr>
+                                        <p:cTn id="6" dur="1" fill="hold">
+                                          <p:stCondLst>
+                                            <p:cond delay="0"/>
+                                          </p:stCondLst>
+                                        </p:cTn>
+                                        <p:tgtEl>
+                                          <p:spTgt spid="20"/>
+                                        </p:tgtEl>
+                                        <p:attrNameLst>
+                                          <p:attrName>style.visibility</p:attrName>
+                                        </p:attrNameLst>
+                                      </p:cBhvr>
+                                      <p:to>
+                                        <p:strVal val="visible"/>
+                                      </p:to>
+                                    </p:set>
+                                  </p:childTnLst>
+                                </p:cTn>
+                              </p:par>
+                            </p:childTnLst>
+                          </p:cTn>
+                        </p:par>
+                        <p:par>
+                          <p:cTn id="7" fill="hold">
+                            <p:stCondLst>
+                              <p:cond delay="2000"/>
+                            </p:stCondLst>
+                            <p:childTnLst>
+                              <p:par>
+                                <p:cTn id="8" presetID="1" presetClass="entr" presetSubtype="0" fill="hold" nodeType="afterEffect">
+                                  <p:stCondLst>
+                                    <p:cond delay="2000"/>
+                                  </p:stCondLst>
+                                  <p:childTnLst>
+                                    <p:set>
+                                      <p:cBhvr>
+                                        <p:cTn id="9" dur="1" fill="hold">
+                                          <p:stCondLst>
+                                            <p:cond delay="0"/>
+                                          </p:stCondLst>
+                                        </p:cTn>
+                                        <p:tgtEl>
+                                          <p:spTgt spid="1053"/>
+                                        </p:tgtEl>
+                                        <p:attrNameLst>
+                                          <p:attrName>style.visibility</p:attrName>
+                                        </p:attrNameLst>
+                                      </p:cBhvr>
+                                      <p:to>
+                                        <p:strVal val="visible"/>
+                                      </p:to>
+                                    </p:set>
+                                  </p:childTnLst>
+                                </p:cTn>
+                              </p:par>
+                            </p:childTnLst>
+                          </p:cTn>
+                        </p:par>
+                        <p:par>
+                          <p:cTn id="10" fill="hold">
+                            <p:stCondLst>
+                              <p:cond delay="4000"/>
+                            </p:stCondLst>
+                            <p:childTnLst>
+                              <p:par>
+                                <p:cTn id="11" presetID="1" presetClass="entr" presetSubtype="0" fill="hold" nodeType="afterEffect">
+                                  <p:stCondLst>
+                                    <p:cond delay="5000"/>
+                                  </p:stCondLst>
+                                  <p:childTnLst>
+                                    <p:set>
+                                      <p:cBhvr>
+                                        <p:cTn id="12" dur="1" fill="hold">
+                                          <p:stCondLst>
+                                            <p:cond delay="0"/>
+                                          </p:stCondLst>
+                                        </p:cTn>
+                                        <p:tgtEl>
+                                          <p:spTgt spid="1028"/>
+                                        </p:tgtEl>
+                                        <p:attrNameLst>
+                                          <p:attrName>style.visibility</p:attrName>
+                                        </p:attrNameLst>
+                                      </p:cBhvr>
+                                      <p:to>
+                                        <p:strVal val="visible"/>
+                                      </p:to>
+                                    </p:set>
+                                  </p:childTnLst>
+                                </p:cTn>
+                              </p:par>
+                            </p:childTnLst>
+                          </p:cTn>
+                        </p:par>
+                        <p:par>
+                          <p:cTn id="13" fill="hold">
+                            <p:stCondLst>
+                              <p:cond delay="9000"/>
+                            </p:stCondLst>
+                            <p:childTnLst>
+                              <p:par>
+                                <p:cTn id="14" presetID="1" presetClass="entr" presetSubtype="0" fill="hold" grpId="0" nodeType="afterEffect">
+                                  <p:stCondLst>
+                                    <p:cond delay="5000"/>
+                                  </p:stCondLst>
+                                  <p:childTnLst>
+                                    <p:set>
+                                      <p:cBhvr>
+                                        <p:cTn id="15" dur="1" fill="hold">
+                                          <p:stCondLst>
+                                            <p:cond delay="0"/>
+                                          </p:stCondLst>
+                                        </p:cTn>
+                                        <p:tgtEl>
+                                          <p:spTgt spid="16"/>
+                                        </p:tgtEl>
+                                        <p:attrNameLst>
+                                          <p:attrName>style.visibility</p:attrName>
+                                        </p:attrNameLst>
+                                      </p:cBhvr>
+                                      <p:to>
+                                        <p:strVal val="visible"/>
+                                      </p:to>
+                                    </p:set>
+                                  </p:childTnLst>
+                                </p:cTn>
+                              </p:par>
+                              <p:par>
+                                <p:cTn id="16" presetID="1" presetClass="entr" presetSubtype="0" fill="hold" nodeType="withEffect">
+                                  <p:stCondLst>
+                                    <p:cond delay="5000"/>
+                                  </p:stCondLst>
+                                  <p:childTnLst>
+                                    <p:set>
+                                      <p:cBhvr>
+                                        <p:cTn id="17" dur="1" fill="hold">
+                                          <p:stCondLst>
+                                            <p:cond delay="0"/>
+                                          </p:stCondLst>
+                                        </p:cTn>
+                                        <p:tgtEl>
+                                          <p:spTgt spid="22"/>
+                                        </p:tgtEl>
+                                        <p:attrNameLst>
+                                          <p:attrName>style.visibility</p:attrName>
+                                        </p:attrNameLst>
+                                      </p:cBhvr>
+                                      <p:to>
+                                        <p:strVal val="visible"/>
+                                      </p:to>
+                                    </p:set>
+                                  </p:childTnLst>
+                                </p:cTn>
+                              </p:par>
+                            </p:childTnLst>
+                          </p:cTn>
+                        </p:par>
+                      </p:childTnLst>
+                    </p:cTn>
+                  </p:par>
+                  <p:par>
+                    <p:cTn id="18" fill="hold">
+                      <p:stCondLst>
+                        <p:cond delay="indefinite"/>
+                      </p:stCondLst>
+                      <p:childTnLst>
+                        <p:par>
+                          <p:cTn id="19" fill="hold">
+                            <p:stCondLst>
+                              <p:cond delay="0"/>
+                            </p:stCondLst>
+                            <p:childTnLst>
+                              <p:par>
+                                <p:cTn id="20" presetID="1" presetClass="entr" presetSubtype="0" fill="hold" nodeType="clickEffect">
+                                  <p:stCondLst>
+                                    <p:cond delay="0"/>
+                                  </p:stCondLst>
+                                  <p:childTnLst>
+                                    <p:set>
+                                      <p:cBhvr>
+                                        <p:cTn id="21" dur="1" fill="hold">
+                                          <p:stCondLst>
+                                            <p:cond delay="0"/>
+                                          </p:stCondLst>
+                                        </p:cTn>
+                                        <p:tgtEl>
+                                          <p:spTgt spid="1030"/>
+                                        </p:tgtEl>
+                                        <p:attrNameLst>
+                                          <p:attrName>style.visibility</p:attrName>
+                                        </p:attrNameLst>
+                                      </p:cBhvr>
+                                      <p:to>
+                                        <p:strVal val="visible"/>
+                                      </p:to>
+                                    </p:set>
+                                  </p:childTnLst>
+                                </p:cTn>
+                              </p:par>
+                            </p:childTnLst>
+                          </p:cTn>
+                        </p:par>
+                        <p:par>
+                          <p:cTn id="22" fill="hold">
+                            <p:stCondLst>
+                              <p:cond delay="0"/>
+                            </p:stCondLst>
+                            <p:childTnLst>
+                              <p:par>
+                                <p:cTn id="23" presetID="1" presetClass="entr" presetSubtype="0" fill="hold" grpId="0" nodeType="afterEffect">
+                                  <p:stCondLst>
+                                    <p:cond delay="0"/>
+                                  </p:stCondLst>
+                                  <p:childTnLst>
+                                    <p:set>
+                                      <p:cBhvr>
+                                        <p:cTn id="24" dur="1" fill="hold">
+                                          <p:stCondLst>
+                                            <p:cond delay="0"/>
+                                          </p:stCondLst>
+                                        </p:cTn>
+                                        <p:tgtEl>
+                                          <p:spTgt spid="17"/>
+                                        </p:tgtEl>
+                                        <p:attrNameLst>
+                                          <p:attrName>style.visibility</p:attrName>
+                                        </p:attrNameLst>
+                                      </p:cBhvr>
+                                      <p:to>
+                                        <p:strVal val="visible"/>
+                                      </p:to>
+                                    </p:set>
+                                  </p:childTnLst>
+                                </p:cTn>
+                              </p:par>
+                              <p:par>
+                                <p:cTn id="25" presetID="1" presetClass="entr" presetSubtype="0" fill="hold" nodeType="withEffect">
+                                  <p:stCondLst>
+                                    <p:cond delay="5000"/>
+                                  </p:stCondLst>
+                                  <p:childTnLst>
+                                    <p:set>
+                                      <p:cBhvr>
+                                        <p:cTn id="26" dur="1" fill="hold">
+                                          <p:stCondLst>
+                                            <p:cond delay="0"/>
+                                          </p:stCondLst>
+                                        </p:cTn>
+                                        <p:tgtEl>
+                                          <p:spTgt spid="24"/>
+                                        </p:tgtEl>
+                                        <p:attrNameLst>
+                                          <p:attrName>style.visibility</p:attrName>
+                                        </p:attrNameLst>
+                                      </p:cBhvr>
+                                      <p:to>
+                                        <p:strVal val="visible"/>
+                                      </p:to>
+                                    </p:set>
+                                  </p:childTnLst>
+                                </p:cTn>
+                              </p:par>
+                            </p:childTnLst>
+                          </p:cTn>
+                        </p:par>
+                      </p:childTnLst>
+                    </p:cTn>
+                  </p:par>
+                  <p:par>
+                    <p:cTn id="27" fill="hold">
+                      <p:stCondLst>
+                        <p:cond delay="indefinite"/>
+                      </p:stCondLst>
+                      <p:childTnLst>
+                        <p:par>
+                          <p:cTn id="28" fill="hold">
+                            <p:stCondLst>
+                              <p:cond delay="0"/>
+                            </p:stCondLst>
+                            <p:childTnLst>
+                              <p:par>
+                                <p:cTn id="29" presetID="1" presetClass="entr" presetSubtype="0" fill="hold" nodeType="clickEffect">
+                                  <p:stCondLst>
+                                    <p:cond delay="0"/>
+                                  </p:stCondLst>
+                                  <p:childTnLst>
+                                    <p:set>
+                                      <p:cBhvr>
+                                        <p:cTn id="30" dur="1" fill="hold">
+                                          <p:stCondLst>
+                                            <p:cond delay="0"/>
+                                          </p:stCondLst>
+                                        </p:cTn>
+                                        <p:tgtEl>
+                                          <p:spTgt spid="3078"/>
+                                        </p:tgtEl>
+                                        <p:attrNameLst>
+                                          <p:attrName>style.visibility</p:attrName>
+                                        </p:attrNameLst>
+                                      </p:cBhvr>
+                                      <p:to>
+                                        <p:strVal val="visible"/>
+                                      </p:to>
+                                    </p:set>
+                                  </p:childTnLst>
+                                </p:cTn>
+                              </p:par>
+                              <p:par>
+                                <p:cTn id="31" presetID="1" presetClass="entr" presetSubtype="0" fill="hold" grpId="0" nodeType="withEffect">
+                                  <p:stCondLst>
+                                    <p:cond delay="0"/>
+                                  </p:stCondLst>
+                                  <p:childTnLst>
+                                    <p:set>
+                                      <p:cBhvr>
+                                        <p:cTn id="32" dur="1" fill="hold">
+                                          <p:stCondLst>
+                                            <p:cond delay="0"/>
+                                          </p:stCondLst>
+                                        </p:cTn>
+                                        <p:tgtEl>
+                                          <p:spTgt spid="21"/>
+                                        </p:tgtEl>
+                                        <p:attrNameLst>
+                                          <p:attrName>style.visibility</p:attrName>
+                                        </p:attrNameLst>
+                                      </p:cBhvr>
+                                      <p:to>
+                                        <p:strVal val="visible"/>
+                                      </p:to>
+                                    </p:set>
+                                  </p:childTnLst>
+                                </p:cTn>
+                              </p:par>
+                            </p:childTnLst>
+                          </p:cTn>
+                        </p:par>
+                      </p:childTnLst>
+                    </p:cTn>
+                  </p:par>
+                  <p:par>
+                    <p:cTn id="33" fill="hold">
+                      <p:stCondLst>
+                        <p:cond delay="indefinite"/>
+                      </p:stCondLst>
+                      <p:childTnLst>
+                        <p:par>
+                          <p:cTn id="34" fill="hold">
+                            <p:stCondLst>
+                              <p:cond delay="0"/>
+                            </p:stCondLst>
+                            <p:childTnLst>
+                              <p:par>
+                                <p:cTn id="35" presetID="1" presetClass="entr" presetSubtype="0" fill="hold" nodeType="clickEffect">
+                                  <p:stCondLst>
+                                    <p:cond delay="0"/>
+                                  </p:stCondLst>
+                                  <p:childTnLst>
+                                    <p:set>
+                                      <p:cBhvr>
+                                        <p:cTn id="36" dur="1" fill="hold">
+                                          <p:stCondLst>
+                                            <p:cond delay="0"/>
+                                          </p:stCondLst>
+                                        </p:cTn>
+                                        <p:tgtEl>
+                                          <p:spTgt spid="3080"/>
+                                        </p:tgtEl>
+                                        <p:attrNameLst>
+                                          <p:attrName>style.visibility</p:attrName>
+                                        </p:attrNameLst>
+                                      </p:cBhvr>
+                                      <p:to>
+                                        <p:strVal val="visible"/>
+                                      </p:to>
+                                    </p:set>
+                                  </p:childTnLst>
+                                </p:cTn>
+                              </p:par>
+                              <p:par>
+                                <p:cTn id="37" presetID="1" presetClass="entr" presetSubtype="0" fill="hold" grpId="0" nodeType="withEffect">
+                                  <p:stCondLst>
+                                    <p:cond delay="0"/>
+                                  </p:stCondLst>
+                                  <p:childTnLst>
+                                    <p:set>
+                                      <p:cBhvr>
+                                        <p:cTn id="38" dur="1" fill="hold">
+                                          <p:stCondLst>
+                                            <p:cond delay="0"/>
+                                          </p:stCondLst>
+                                        </p:cTn>
+                                        <p:tgtEl>
+                                          <p:spTgt spid="23"/>
+                                        </p:tgtEl>
+                                        <p:attrNameLst>
+                                          <p:attrName>style.visibility</p:attrName>
+                                        </p:attrNameLst>
+                                      </p:cBhvr>
+                                      <p:to>
+                                        <p:strVal val="visible"/>
+                                      </p:to>
+                                    </p:set>
+                                  </p:childTnLst>
+                                </p:cTn>
+                              </p:par>
+                            </p:childTnLst>
+                          </p:cTn>
+                        </p:par>
+                      </p:childTnLst>
+                    </p:cTn>
+                  </p:par>
+                  <p:par>
+                    <p:cTn id="39" fill="hold">
+                      <p:stCondLst>
+                        <p:cond delay="indefinite"/>
+                      </p:stCondLst>
+                      <p:childTnLst>
+                        <p:par>
+                          <p:cTn id="40" fill="hold">
+                            <p:stCondLst>
+                              <p:cond delay="0"/>
+                            </p:stCondLst>
+                            <p:childTnLst>
+                              <p:par>
+                                <p:cTn id="41" presetID="1" presetClass="entr" presetSubtype="0" fill="hold" nodeType="clickEffect">
+                                  <p:stCondLst>
+                                    <p:cond delay="0"/>
+                                  </p:stCondLst>
+                                  <p:childTnLst>
+                                    <p:set>
+                                      <p:cBhvr>
+                                        <p:cTn id="42" dur="1" fill="hold">
+                                          <p:stCondLst>
+                                            <p:cond delay="0"/>
+                                          </p:stCondLst>
+                                        </p:cTn>
+                                        <p:tgtEl>
+                                          <p:spTgt spid="13"/>
+                                        </p:tgtEl>
+                                        <p:attrNameLst>
+                                          <p:attrName>style.visibility</p:attrName>
+                                        </p:attrNameLst>
+                                      </p:cBhvr>
+                                      <p:to>
+                                        <p:strVal val="visible"/>
+                                      </p:to>
+                                    </p:set>
+                                  </p:childTnLst>
+                                </p:cTn>
+                              </p:par>
+                              <p:par>
+                                <p:cTn id="43" presetID="1" presetClass="entr" presetSubtype="0" fill="hold" grpId="0" nodeType="withEffect">
+                                  <p:stCondLst>
+                                    <p:cond delay="0"/>
+                                  </p:stCondLst>
+                                  <p:childTnLst>
+                                    <p:set>
+                                      <p:cBhvr>
+                                        <p:cTn id="44" dur="1" fill="hold">
+                                          <p:stCondLst>
+                                            <p:cond delay="0"/>
+                                          </p:stCondLst>
+                                        </p:cTn>
+                                        <p:tgtEl>
+                                          <p:spTgt spid="18"/>
+                                        </p:tgtEl>
+                                        <p:attrNameLst>
+                                          <p:attrName>style.visibility</p:attrName>
+                                        </p:attrNameLst>
+                                      </p:cBhvr>
+                                      <p:to>
+                                        <p:strVal val="visible"/>
+                                      </p:to>
+                                    </p:set>
+                                  </p:childTnLst>
+                                </p:cTn>
+                              </p:par>
+                            </p:childTnLst>
+                          </p:cTn>
+                        </p:par>
+                        <p:par>
+                          <p:cTn id="45" fill="hold">
+                            <p:stCondLst>
+                              <p:cond delay="0"/>
+                            </p:stCondLst>
+                            <p:childTnLst>
+                              <p:par>
+                                <p:cTn id="46" presetID="1" presetClass="entr" presetSubtype="0" fill="hold" nodeType="afterEffect">
+                                  <p:stCondLst>
+                                    <p:cond delay="5000"/>
+                                  </p:stCondLst>
+                                  <p:childTnLst>
+                                    <p:set>
+                                      <p:cBhvr>
+                                        <p:cTn id="47" dur="1" fill="hold">
+                                          <p:stCondLst>
+                                            <p:cond delay="0"/>
+                                          </p:stCondLst>
+                                        </p:cTn>
+                                        <p:tgtEl>
+                                          <p:spTgt spid="25"/>
+                                        </p:tgtEl>
+                                        <p:attrNameLst>
+                                          <p:attrName>style.visibility</p:attrName>
+                                        </p:attrNameLst>
+                                      </p:cBhvr>
+                                      <p:to>
+                                        <p:strVal val="visible"/>
+                                      </p:to>
+                                    </p:set>
+                                  </p:childTnLst>
+                                </p:cTn>
+                              </p:par>
+                            </p:childTnLst>
+                          </p:cTn>
+                        </p:par>
+                      </p:childTnLst>
+                    </p:cTn>
+                  </p:par>
+                </p:childTnLst>
+              </p:cTn>
+              <p:prevCondLst>
+                <p:cond evt="onPrev" delay="0">
+                  <p:tgtEl>
+                    <p:sldTgt/>
+                  </p:tgtEl>
+                </p:cond>
+              </p:prevCondLst>
+              <p:nextCondLst>
+                <p:cond evt="onNext" delay="0">
+                  <p:tgtEl>
+                    <p:sldTgt/>
+                  </p:tgtEl>
+                </p:cond>
+              </p:nextCondLst>
+            </p:seq>
+          </p:childTnLst>
+        </p:cTn>
       </p:par>
     </p:tnLst>
+    <p:bldLst>
+      <p:bldP spid="16" grpId="0"/>
+      <p:bldP spid="17" grpId="0"/>
+      <p:bldP spid="18" grpId="0"/>
+      <p:bldP spid="20" grpId="0"/>
+      <p:bldP spid="21" grpId="0"/>
+      <p:bldP spid="23" grpId="0"/>
+    </p:bldLst>
   </p:timing>
 </p:sld>
 </file>
@@ -26151,6 +26905,91 @@
       </p:grpSpPr>
       <p:pic>
         <p:nvPicPr>
+          <p:cNvPr id="1034" name="Picture 10" descr="Imagem relacionada"/>
+          <p:cNvPicPr>
+            <a:picLocks noChangeAspect="1" noChangeArrowheads="1"/>
+          </p:cNvPicPr>
+          <p:nvPr/>
+        </p:nvPicPr>
+        <p:blipFill rotWithShape="1">
+          <a:blip r:embed="rId2">
+            <a:duotone>
+              <a:schemeClr val="accent3">
+                <a:shade val="45000"/>
+                <a:satMod val="135000"/>
+              </a:schemeClr>
+              <a:prstClr val="white"/>
+            </a:duotone>
+            <a:extLst>
+              <a:ext uri="{BEBA8EAE-BF5A-486C-A8C5-ECC9F3942E4B}">
+                <a14:imgProps xmlns:a14="http://schemas.microsoft.com/office/drawing/2010/main">
+                  <a14:imgLayer r:embed="rId3">
+                    <a14:imgEffect>
+                      <a14:brightnessContrast contrast="20000"/>
+                    </a14:imgEffect>
+                  </a14:imgLayer>
+                </a14:imgProps>
+              </a:ext>
+              <a:ext uri="{28A0092B-C50C-407E-A947-70E740481C1C}">
+                <a14:useLocalDpi xmlns:a14="http://schemas.microsoft.com/office/drawing/2010/main" val="0"/>
+              </a:ext>
+            </a:extLst>
+          </a:blip>
+          <a:srcRect l="4874" t="-1084" r="4710" b="10001"/>
+          <a:stretch/>
+        </p:blipFill>
+        <p:spPr bwMode="auto">
+          <a:xfrm>
+            <a:off x="5076056" y="1877786"/>
+            <a:ext cx="3655977" cy="3639446"/>
+          </a:xfrm>
+          <a:prstGeom prst="ellipse">
+            <a:avLst/>
+          </a:prstGeom>
+          <a:ln>
+            <a:noFill/>
+          </a:ln>
+          <a:effectLst>
+            <a:softEdge rad="112500"/>
+          </a:effectLst>
+          <a:extLst>
+            <a:ext uri="{909E8E84-426E-40DD-AFC4-6F175D3DCCD1}">
+              <a14:hiddenFill xmlns:a14="http://schemas.microsoft.com/office/drawing/2010/main">
+                <a:solidFill>
+                  <a:srgbClr val="FFFFFF"/>
+                </a:solidFill>
+              </a14:hiddenFill>
+            </a:ext>
+          </a:extLst>
+        </p:spPr>
+      </p:pic>
+      <p:graphicFrame>
+        <p:nvGraphicFramePr>
+          <p:cNvPr id="11" name="Espaço Reservado para Conteúdo 10"/>
+          <p:cNvGraphicFramePr>
+            <a:graphicFrameLocks noGrp="1"/>
+          </p:cNvGraphicFramePr>
+          <p:nvPr>
+            <p:ph idx="1"/>
+            <p:extLst>
+              <p:ext uri="{D42A27DB-BD31-4B8C-83A1-F6EECF244321}">
+                <p14:modId xmlns:p14="http://schemas.microsoft.com/office/powerpoint/2010/main" val="956329246"/>
+              </p:ext>
+            </p:extLst>
+          </p:nvPr>
+        </p:nvGraphicFramePr>
+        <p:xfrm>
+          <a:off x="413792" y="1340768"/>
+          <a:ext cx="8730207" cy="4752528"/>
+        </p:xfrm>
+        <a:graphic>
+          <a:graphicData uri="http://schemas.openxmlformats.org/drawingml/2006/diagram">
+            <dgm:relIds xmlns:dgm="http://schemas.openxmlformats.org/drawingml/2006/diagram" xmlns:r="http://schemas.openxmlformats.org/officeDocument/2006/relationships" r:dm="rId4" r:lo="rId5" r:qs="rId6" r:cs="rId7"/>
+          </a:graphicData>
+        </a:graphic>
+      </p:graphicFrame>
+      <p:pic>
+        <p:nvPicPr>
           <p:cNvPr id="1026" name="Picture 2" descr="Resultado de imagem para serviÃ§os web"/>
           <p:cNvPicPr>
             <a:picLocks noChangeAspect="1" noChangeArrowheads="1"/>
@@ -26158,11 +26997,11 @@
           <p:nvPr/>
         </p:nvPicPr>
         <p:blipFill rotWithShape="1">
-          <a:blip r:embed="rId2">
+          <a:blip r:embed="rId9">
             <a:extLst>
               <a:ext uri="{BEBA8EAE-BF5A-486C-A8C5-ECC9F3942E4B}">
                 <a14:imgProps xmlns:a14="http://schemas.microsoft.com/office/drawing/2010/main">
-                  <a14:imgLayer r:embed="rId3">
+                  <a14:imgLayer r:embed="rId10">
                     <a14:imgEffect>
                       <a14:colorTemperature colorTemp="5900"/>
                     </a14:imgEffect>
@@ -26222,12 +27061,11 @@
           <a:bodyPr/>
           <a:lstStyle/>
           <a:p>
-            <a:pPr algn="l"/>
             <a:r>
-              <a:rPr lang="pt-BR" sz="3200" dirty="0" smtClean="0"/>
-              <a:t>Implicação</a:t>
+              <a:rPr lang="pt-BR" sz="1600" dirty="0" smtClean="0"/>
+              <a:t>Disparo de notificação</a:t>
             </a:r>
-            <a:endParaRPr lang="pt-BR" sz="3200" dirty="0"/>
+            <a:endParaRPr lang="pt-BR" sz="1600" dirty="0"/>
           </a:p>
         </p:txBody>
       </p:sp>
@@ -26240,7 +27078,7 @@
           <p:nvPr/>
         </p:nvPicPr>
         <p:blipFill rotWithShape="1">
-          <a:blip r:embed="rId4">
+          <a:blip r:embed="rId11">
             <a:extLst>
               <a:ext uri="{28A0092B-C50C-407E-A947-70E740481C1C}">
                 <a14:useLocalDpi xmlns:a14="http://schemas.microsoft.com/office/drawing/2010/main" val="0"/>
@@ -26275,31 +27113,6 @@
           </a:extLst>
         </p:spPr>
       </p:pic>
-      <p:graphicFrame>
-        <p:nvGraphicFramePr>
-          <p:cNvPr id="11" name="Espaço Reservado para Conteúdo 10"/>
-          <p:cNvGraphicFramePr>
-            <a:graphicFrameLocks noGrp="1"/>
-          </p:cNvGraphicFramePr>
-          <p:nvPr>
-            <p:ph idx="1"/>
-            <p:extLst>
-              <p:ext uri="{D42A27DB-BD31-4B8C-83A1-F6EECF244321}">
-                <p14:modId xmlns:p14="http://schemas.microsoft.com/office/powerpoint/2010/main" val="3007311410"/>
-              </p:ext>
-            </p:extLst>
-          </p:nvPr>
-        </p:nvGraphicFramePr>
-        <p:xfrm>
-          <a:off x="9168" y="1548234"/>
-          <a:ext cx="9144000" cy="4545062"/>
-        </p:xfrm>
-        <a:graphic>
-          <a:graphicData uri="http://schemas.openxmlformats.org/drawingml/2006/diagram">
-            <dgm:relIds xmlns:dgm="http://schemas.openxmlformats.org/drawingml/2006/diagram" xmlns:r="http://schemas.openxmlformats.org/officeDocument/2006/relationships" r:dm="rId5" r:lo="rId6" r:qs="rId7" r:cs="rId8"/>
-          </a:graphicData>
-        </a:graphic>
-      </p:graphicFrame>
       <p:pic>
         <p:nvPicPr>
           <p:cNvPr id="1030" name="Picture 6" descr="Resultado de imagem para servidor nuvem vector"/>
@@ -26309,7 +27122,7 @@
           <p:nvPr/>
         </p:nvPicPr>
         <p:blipFill>
-          <a:blip r:embed="rId10">
+          <a:blip r:embed="rId12">
             <a:duotone>
               <a:schemeClr val="accent3">
                 <a:shade val="45000"/>
@@ -26320,7 +27133,7 @@
             <a:extLst>
               <a:ext uri="{BEBA8EAE-BF5A-486C-A8C5-ECC9F3942E4B}">
                 <a14:imgProps xmlns:a14="http://schemas.microsoft.com/office/drawing/2010/main">
-                  <a14:imgLayer r:embed="rId11">
+                  <a14:imgLayer r:embed="rId13">
                     <a14:imgEffect>
                       <a14:sharpenSoften amount="-50000"/>
                     </a14:imgEffect>
@@ -26339,7 +27152,7 @@
         </p:blipFill>
         <p:spPr bwMode="auto">
           <a:xfrm>
-            <a:off x="-127168" y="2247892"/>
+            <a:off x="35496" y="2247892"/>
             <a:ext cx="954752" cy="954752"/>
           </a:xfrm>
           <a:prstGeom prst="ellipse">
@@ -26370,7 +27183,7 @@
         </p:nvSpPr>
         <p:spPr>
           <a:xfrm>
-            <a:off x="5875631" y="6237312"/>
+            <a:off x="5875631" y="6257051"/>
             <a:ext cx="2045753" cy="307777"/>
           </a:xfrm>
           <a:prstGeom prst="rect">
@@ -26396,6 +27209,154 @@
           </a:p>
         </p:txBody>
       </p:sp>
+      <p:sp>
+        <p:nvSpPr>
+          <p:cNvPr id="17" name="CaixaDeTexto 16"/>
+          <p:cNvSpPr txBox="1"/>
+          <p:nvPr/>
+        </p:nvSpPr>
+        <p:spPr>
+          <a:xfrm>
+            <a:off x="23777" y="3760387"/>
+            <a:ext cx="1019831" cy="307777"/>
+          </a:xfrm>
+          <a:prstGeom prst="rect">
+            <a:avLst/>
+          </a:prstGeom>
+          <a:noFill/>
+        </p:spPr>
+        <p:txBody>
+          <a:bodyPr wrap="none" rtlCol="0">
+            <a:spAutoFit/>
+          </a:bodyPr>
+          <a:lstStyle/>
+          <a:p>
+            <a:r>
+              <a:rPr lang="pt-BR" sz="1400" dirty="0" smtClean="0">
+                <a:latin typeface="Palatino Linotype (Corpo)"/>
+              </a:rPr>
+              <a:t>Faculdade</a:t>
+            </a:r>
+            <a:endParaRPr lang="pt-BR" sz="1400" dirty="0">
+              <a:latin typeface="Palatino Linotype (Corpo)"/>
+            </a:endParaRPr>
+          </a:p>
+        </p:txBody>
+      </p:sp>
+      <p:pic>
+        <p:nvPicPr>
+          <p:cNvPr id="15" name="Picture 2" descr="Imagem relacionada"/>
+          <p:cNvPicPr>
+            <a:picLocks noChangeAspect="1" noChangeArrowheads="1"/>
+          </p:cNvPicPr>
+          <p:nvPr/>
+        </p:nvPicPr>
+        <p:blipFill rotWithShape="1">
+          <a:blip r:embed="rId14" cstate="print">
+            <a:extLst>
+              <a:ext uri="{28A0092B-C50C-407E-A947-70E740481C1C}">
+                <a14:useLocalDpi xmlns:a14="http://schemas.microsoft.com/office/drawing/2010/main" val="0"/>
+              </a:ext>
+            </a:extLst>
+          </a:blip>
+          <a:srcRect l="16970" t="16070" r="15625" b="14439"/>
+          <a:stretch/>
+        </p:blipFill>
+        <p:spPr bwMode="auto">
+          <a:xfrm>
+            <a:off x="251520" y="3202644"/>
+            <a:ext cx="504056" cy="519651"/>
+          </a:xfrm>
+          <a:prstGeom prst="rect">
+            <a:avLst/>
+          </a:prstGeom>
+          <a:noFill/>
+          <a:extLst>
+            <a:ext uri="{909E8E84-426E-40DD-AFC4-6F175D3DCCD1}">
+              <a14:hiddenFill xmlns:a14="http://schemas.microsoft.com/office/drawing/2010/main">
+                <a:solidFill>
+                  <a:srgbClr val="FFFFFF"/>
+                </a:solidFill>
+              </a14:hiddenFill>
+            </a:ext>
+          </a:extLst>
+        </p:spPr>
+      </p:pic>
+      <p:cxnSp>
+        <p:nvCxnSpPr>
+          <p:cNvPr id="18" name="Conector de seta reta 17"/>
+          <p:cNvCxnSpPr/>
+          <p:nvPr/>
+        </p:nvCxnSpPr>
+        <p:spPr>
+          <a:xfrm>
+            <a:off x="1115616" y="2996952"/>
+            <a:ext cx="5991428" cy="2520280"/>
+          </a:xfrm>
+          <a:prstGeom prst="straightConnector1">
+            <a:avLst/>
+          </a:prstGeom>
+          <a:ln>
+            <a:prstDash val="sysDash"/>
+            <a:headEnd type="arrow"/>
+            <a:tailEnd type="arrow"/>
+          </a:ln>
+        </p:spPr>
+        <p:style>
+          <a:lnRef idx="3">
+            <a:schemeClr val="accent5"/>
+          </a:lnRef>
+          <a:fillRef idx="0">
+            <a:schemeClr val="accent5"/>
+          </a:fillRef>
+          <a:effectRef idx="2">
+            <a:schemeClr val="accent5"/>
+          </a:effectRef>
+          <a:fontRef idx="minor">
+            <a:schemeClr val="tx1"/>
+          </a:fontRef>
+        </p:style>
+      </p:cxnSp>
+      <p:sp>
+        <p:nvSpPr>
+          <p:cNvPr id="51" name="CaixaDeTexto 50"/>
+          <p:cNvSpPr txBox="1"/>
+          <p:nvPr/>
+        </p:nvSpPr>
+        <p:spPr>
+          <a:xfrm>
+            <a:off x="6416500" y="1961545"/>
+            <a:ext cx="864096" cy="1323439"/>
+          </a:xfrm>
+          <a:prstGeom prst="rect">
+            <a:avLst/>
+          </a:prstGeom>
+          <a:noFill/>
+        </p:spPr>
+        <p:txBody>
+          <a:bodyPr wrap="square" rtlCol="0">
+            <a:spAutoFit/>
+          </a:bodyPr>
+          <a:lstStyle/>
+          <a:p>
+            <a:r>
+              <a:rPr lang="pt-BR" sz="8000" dirty="0" smtClean="0">
+                <a:solidFill>
+                  <a:srgbClr val="FF0000"/>
+                </a:solidFill>
+                <a:latin typeface="Segoe Print" pitchFamily="2" charset="0"/>
+              </a:rPr>
+              <a:t>X</a:t>
+            </a:r>
+            <a:endParaRPr lang="pt-BR" sz="8000" dirty="0">
+              <a:solidFill>
+                <a:srgbClr val="FF0000"/>
+              </a:solidFill>
+              <a:latin typeface="Segoe Print" pitchFamily="2" charset="0"/>
+            </a:endParaRPr>
+          </a:p>
+        </p:txBody>
+      </p:sp>
     </p:spTree>
     <p:extLst>
       <p:ext uri="{BB962C8B-B14F-4D97-AF65-F5344CB8AC3E}">
@@ -26409,9 +27370,217 @@
   <p:timing>
     <p:tnLst>
       <p:par>
-        <p:cTn id="1" dur="indefinite" restart="never" nodeType="tmRoot"/>
+        <p:cTn id="1" dur="indefinite" restart="never" nodeType="tmRoot">
+          <p:childTnLst>
+            <p:seq concurrent="1" nextAc="seek">
+              <p:cTn id="2" dur="indefinite" nodeType="mainSeq">
+                <p:childTnLst>
+                  <p:par>
+                    <p:cTn id="3" fill="hold">
+                      <p:stCondLst>
+                        <p:cond delay="indefinite"/>
+                      </p:stCondLst>
+                      <p:childTnLst>
+                        <p:par>
+                          <p:cTn id="4" fill="hold">
+                            <p:stCondLst>
+                              <p:cond delay="0"/>
+                            </p:stCondLst>
+                            <p:childTnLst>
+                              <p:par>
+                                <p:cTn id="5" presetID="1" presetClass="entr" presetSubtype="0" fill="hold" grpId="0" nodeType="clickEffect">
+                                  <p:stCondLst>
+                                    <p:cond delay="0"/>
+                                  </p:stCondLst>
+                                  <p:childTnLst>
+                                    <p:set>
+                                      <p:cBhvr>
+                                        <p:cTn id="6" dur="1" fill="hold">
+                                          <p:stCondLst>
+                                            <p:cond delay="0"/>
+                                          </p:stCondLst>
+                                        </p:cTn>
+                                        <p:tgtEl>
+                                          <p:spTgt spid="11"/>
+                                        </p:tgtEl>
+                                        <p:attrNameLst>
+                                          <p:attrName>style.visibility</p:attrName>
+                                        </p:attrNameLst>
+                                      </p:cBhvr>
+                                      <p:to>
+                                        <p:strVal val="visible"/>
+                                      </p:to>
+                                    </p:set>
+                                  </p:childTnLst>
+                                </p:cTn>
+                              </p:par>
+                            </p:childTnLst>
+                          </p:cTn>
+                        </p:par>
+                        <p:par>
+                          <p:cTn id="7" fill="hold">
+                            <p:stCondLst>
+                              <p:cond delay="0"/>
+                            </p:stCondLst>
+                            <p:childTnLst>
+                              <p:par>
+                                <p:cTn id="8" presetID="10" presetClass="exit" presetSubtype="0" fill="hold" nodeType="afterEffect">
+                                  <p:stCondLst>
+                                    <p:cond delay="0"/>
+                                  </p:stCondLst>
+                                  <p:childTnLst>
+                                    <p:animEffect transition="out" filter="fade">
+                                      <p:cBhvr>
+                                        <p:cTn id="9" dur="500"/>
+                                        <p:tgtEl>
+                                          <p:spTgt spid="18"/>
+                                        </p:tgtEl>
+                                      </p:cBhvr>
+                                    </p:animEffect>
+                                    <p:set>
+                                      <p:cBhvr>
+                                        <p:cTn id="10" dur="1" fill="hold">
+                                          <p:stCondLst>
+                                            <p:cond delay="499"/>
+                                          </p:stCondLst>
+                                        </p:cTn>
+                                        <p:tgtEl>
+                                          <p:spTgt spid="18"/>
+                                        </p:tgtEl>
+                                        <p:attrNameLst>
+                                          <p:attrName>style.visibility</p:attrName>
+                                        </p:attrNameLst>
+                                      </p:cBhvr>
+                                      <p:to>
+                                        <p:strVal val="hidden"/>
+                                      </p:to>
+                                    </p:set>
+                                  </p:childTnLst>
+                                </p:cTn>
+                              </p:par>
+                            </p:childTnLst>
+                          </p:cTn>
+                        </p:par>
+                      </p:childTnLst>
+                    </p:cTn>
+                  </p:par>
+                  <p:par>
+                    <p:cTn id="11" fill="hold">
+                      <p:stCondLst>
+                        <p:cond delay="indefinite"/>
+                      </p:stCondLst>
+                      <p:childTnLst>
+                        <p:par>
+                          <p:cTn id="12" fill="hold">
+                            <p:stCondLst>
+                              <p:cond delay="0"/>
+                            </p:stCondLst>
+                            <p:childTnLst>
+                              <p:par>
+                                <p:cTn id="13" presetID="1" presetClass="entr" presetSubtype="0" fill="hold" nodeType="clickEffect">
+                                  <p:stCondLst>
+                                    <p:cond delay="0"/>
+                                  </p:stCondLst>
+                                  <p:childTnLst>
+                                    <p:set>
+                                      <p:cBhvr>
+                                        <p:cTn id="14" dur="1" fill="hold">
+                                          <p:stCondLst>
+                                            <p:cond delay="0"/>
+                                          </p:stCondLst>
+                                        </p:cTn>
+                                        <p:tgtEl>
+                                          <p:spTgt spid="1034"/>
+                                        </p:tgtEl>
+                                        <p:attrNameLst>
+                                          <p:attrName>style.visibility</p:attrName>
+                                        </p:attrNameLst>
+                                      </p:cBhvr>
+                                      <p:to>
+                                        <p:strVal val="visible"/>
+                                      </p:to>
+                                    </p:set>
+                                  </p:childTnLst>
+                                </p:cTn>
+                              </p:par>
+                            </p:childTnLst>
+                          </p:cTn>
+                        </p:par>
+                      </p:childTnLst>
+                    </p:cTn>
+                  </p:par>
+                  <p:par>
+                    <p:cTn id="15" fill="hold">
+                      <p:stCondLst>
+                        <p:cond delay="indefinite"/>
+                      </p:stCondLst>
+                      <p:childTnLst>
+                        <p:par>
+                          <p:cTn id="16" fill="hold">
+                            <p:stCondLst>
+                              <p:cond delay="0"/>
+                            </p:stCondLst>
+                            <p:childTnLst>
+                              <p:par>
+                                <p:cTn id="17" presetID="1" presetClass="entr" presetSubtype="0" fill="hold" grpId="0" nodeType="clickEffect">
+                                  <p:stCondLst>
+                                    <p:cond delay="0"/>
+                                  </p:stCondLst>
+                                  <p:childTnLst>
+                                    <p:set>
+                                      <p:cBhvr>
+                                        <p:cTn id="18" dur="1" fill="hold">
+                                          <p:stCondLst>
+                                            <p:cond delay="0"/>
+                                          </p:stCondLst>
+                                        </p:cTn>
+                                        <p:tgtEl>
+                                          <p:spTgt spid="51"/>
+                                        </p:tgtEl>
+                                        <p:attrNameLst>
+                                          <p:attrName>style.visibility</p:attrName>
+                                        </p:attrNameLst>
+                                      </p:cBhvr>
+                                      <p:to>
+                                        <p:strVal val="visible"/>
+                                      </p:to>
+                                    </p:set>
+                                  </p:childTnLst>
+                                </p:cTn>
+                              </p:par>
+                            </p:childTnLst>
+                          </p:cTn>
+                        </p:par>
+                      </p:childTnLst>
+                    </p:cTn>
+                  </p:par>
+                </p:childTnLst>
+              </p:cTn>
+              <p:prevCondLst>
+                <p:cond evt="onPrev" delay="0">
+                  <p:tgtEl>
+                    <p:sldTgt/>
+                  </p:tgtEl>
+                </p:cond>
+              </p:prevCondLst>
+              <p:nextCondLst>
+                <p:cond evt="onNext" delay="0">
+                  <p:tgtEl>
+                    <p:sldTgt/>
+                  </p:tgtEl>
+                </p:cond>
+              </p:nextCondLst>
+            </p:seq>
+          </p:childTnLst>
+        </p:cTn>
       </p:par>
     </p:tnLst>
+    <p:bldLst>
+      <p:bldGraphic spid="11" grpId="0">
+        <p:bldAsOne/>
+      </p:bldGraphic>
+      <p:bldP spid="51" grpId="0"/>
+    </p:bldLst>
   </p:timing>
 </p:sld>
 </file>
@@ -26513,7 +27682,7 @@
           <p:nvPr>
             <p:extLst>
               <p:ext uri="{D42A27DB-BD31-4B8C-83A1-F6EECF244321}">
-                <p14:modId xmlns:p14="http://schemas.microsoft.com/office/powerpoint/2010/main" val="643096917"/>
+                <p14:modId xmlns:p14="http://schemas.microsoft.com/office/powerpoint/2010/main" val="2980659280"/>
               </p:ext>
             </p:extLst>
           </p:nvPr>
@@ -26740,9 +27909,12 @@
             <a:pPr algn="l"/>
             <a:r>
               <a:rPr lang="pt-BR" sz="3200" dirty="0" smtClean="0"/>
-              <a:t>Arquitetura da aplicação</a:t>
+              <a:t>Arquitetura -</a:t>
             </a:r>
-            <a:endParaRPr lang="pt-BR" sz="3200" dirty="0"/>
+            <a:r>
+              <a:rPr lang="pt-BR" sz="3200" dirty="0"/>
+              <a:t> Visão geral </a:t>
+            </a:r>
           </a:p>
         </p:txBody>
       </p:sp>
@@ -27074,9 +28246,80 @@
   <p:timing>
     <p:tnLst>
       <p:par>
-        <p:cTn id="1" dur="indefinite" restart="never" nodeType="tmRoot"/>
+        <p:cTn id="1" dur="indefinite" restart="never" nodeType="tmRoot">
+          <p:childTnLst>
+            <p:seq concurrent="1" nextAc="seek">
+              <p:cTn id="2" dur="indefinite" nodeType="mainSeq">
+                <p:childTnLst>
+                  <p:par>
+                    <p:cTn id="3" fill="hold">
+                      <p:stCondLst>
+                        <p:cond delay="indefinite"/>
+                      </p:stCondLst>
+                      <p:childTnLst>
+                        <p:par>
+                          <p:cTn id="4" fill="hold">
+                            <p:stCondLst>
+                              <p:cond delay="0"/>
+                            </p:stCondLst>
+                            <p:childTnLst>
+                              <p:par>
+                                <p:cTn id="5" presetID="1" presetClass="entr" presetSubtype="0" fill="hold" grpId="0" nodeType="clickEffect">
+                                  <p:stCondLst>
+                                    <p:cond delay="0"/>
+                                  </p:stCondLst>
+                                  <p:childTnLst>
+                                    <p:set>
+                                      <p:cBhvr>
+                                        <p:cTn id="6" dur="1" fill="hold">
+                                          <p:stCondLst>
+                                            <p:cond delay="0"/>
+                                          </p:stCondLst>
+                                        </p:cTn>
+                                        <p:tgtEl>
+                                          <p:spTgt spid="12"/>
+                                        </p:tgtEl>
+                                        <p:attrNameLst>
+                                          <p:attrName>style.visibility</p:attrName>
+                                        </p:attrNameLst>
+                                      </p:cBhvr>
+                                      <p:to>
+                                        <p:strVal val="visible"/>
+                                      </p:to>
+                                    </p:set>
+                                  </p:childTnLst>
+                                </p:cTn>
+                              </p:par>
+                            </p:childTnLst>
+                          </p:cTn>
+                        </p:par>
+                      </p:childTnLst>
+                    </p:cTn>
+                  </p:par>
+                </p:childTnLst>
+              </p:cTn>
+              <p:prevCondLst>
+                <p:cond evt="onPrev" delay="0">
+                  <p:tgtEl>
+                    <p:sldTgt/>
+                  </p:tgtEl>
+                </p:cond>
+              </p:prevCondLst>
+              <p:nextCondLst>
+                <p:cond evt="onNext" delay="0">
+                  <p:tgtEl>
+                    <p:sldTgt/>
+                  </p:tgtEl>
+                </p:cond>
+              </p:nextCondLst>
+            </p:seq>
+          </p:childTnLst>
+        </p:cTn>
       </p:par>
     </p:tnLst>
+    <p:bldLst>
+      <p:bldP spid="12" grpId="0" animBg="1"/>
+    </p:bldLst>
   </p:timing>
 </p:sld>
 </file>
@@ -27231,7 +28474,7 @@
               <a:off x="2" y="1152128"/>
               <a:ext cx="1386662" cy="1000826"/>
             </a:xfrm>
-            <a:prstGeom prst="rect">
+            <a:prstGeom prst="ellipse">
               <a:avLst/>
             </a:prstGeom>
             <a:blipFill rotWithShape="0">
@@ -27277,7 +28520,7 @@
               <a:off x="2" y="1152128"/>
               <a:ext cx="1386662" cy="1000826"/>
             </a:xfrm>
-            <a:prstGeom prst="rect">
+            <a:prstGeom prst="ellipse">
               <a:avLst/>
             </a:prstGeom>
           </p:spPr>
@@ -27634,8 +28877,8 @@
         </p:nvSpPr>
         <p:spPr>
           <a:xfrm>
-            <a:off x="3419872" y="3173289"/>
-            <a:ext cx="2019779" cy="338554"/>
+            <a:off x="3567442" y="3173289"/>
+            <a:ext cx="1872209" cy="338554"/>
           </a:xfrm>
           <a:prstGeom prst="rect">
             <a:avLst/>
@@ -27650,8 +28893,12 @@
           <a:p>
             <a:pPr algn="r"/>
             <a:r>
+              <a:rPr lang="pt-BR" sz="1600" dirty="0"/>
+              <a:t>Web </a:t>
+            </a:r>
+            <a:r>
               <a:rPr lang="pt-BR" sz="1600" dirty="0" smtClean="0"/>
-              <a:t>Web Servisses Java</a:t>
+              <a:t>Servisse Java</a:t>
             </a:r>
             <a:endParaRPr lang="pt-BR" sz="1600" dirty="0"/>
           </a:p>
@@ -27709,14 +28956,10 @@
           <a:p>
             <a:pPr algn="l"/>
             <a:r>
-              <a:rPr lang="pt-BR" sz="2800" dirty="0" smtClean="0"/>
-              <a:t>Ambiente de </a:t>
+              <a:rPr lang="pt-BR" sz="3200" dirty="0" smtClean="0"/>
+              <a:t>Arquitetura – integração de serviços</a:t>
             </a:r>
-            <a:r>
-              <a:rPr lang="pt-BR" sz="2800" dirty="0" smtClean="0"/>
-              <a:t>integração com servidor</a:t>
-            </a:r>
-            <a:endParaRPr lang="pt-BR" sz="2800" dirty="0"/>
+            <a:endParaRPr lang="pt-BR" sz="3200" dirty="0"/>
           </a:p>
         </p:txBody>
       </p:sp>
@@ -27796,7 +29039,7 @@
             </a:r>
             <a:r>
               <a:rPr lang="pt-BR" sz="1600" dirty="0" smtClean="0"/>
-              <a:t>o sistema</a:t>
+              <a:t>o sistema AC</a:t>
             </a:r>
             <a:endParaRPr lang="pt-BR" sz="1600" dirty="0"/>
           </a:p>
@@ -27817,11 +29060,9 @@
             <a:avLst/>
           </a:prstGeom>
           <a:noFill/>
-          <a:ln>
+          <a:ln w="76200">
             <a:solidFill>
-              <a:schemeClr val="accent6">
-                <a:lumMod val="50000"/>
-              </a:schemeClr>
+              <a:srgbClr val="00B050"/>
             </a:solidFill>
             <a:prstDash val="sysDot"/>
           </a:ln>
@@ -27930,6 +29171,104 @@
           </a:p>
         </p:txBody>
       </p:sp>
+      <p:pic>
+        <p:nvPicPr>
+          <p:cNvPr id="2050" name="Picture 2" descr="D:\Neimar\Dropbox\Projetos\Corpore\corpore\web\images\Pessoas.png"/>
+          <p:cNvPicPr>
+            <a:picLocks noChangeAspect="1" noChangeArrowheads="1"/>
+          </p:cNvPicPr>
+          <p:nvPr/>
+        </p:nvPicPr>
+        <p:blipFill rotWithShape="1">
+          <a:blip r:embed="rId12">
+            <a:extLst>
+              <a:ext uri="{28A0092B-C50C-407E-A947-70E740481C1C}">
+                <a14:useLocalDpi xmlns:a14="http://schemas.microsoft.com/office/drawing/2010/main" val="0"/>
+              </a:ext>
+            </a:extLst>
+          </a:blip>
+          <a:srcRect l="3505" t="-12875" r="-3505" b="12875"/>
+          <a:stretch/>
+        </p:blipFill>
+        <p:spPr bwMode="auto">
+          <a:xfrm>
+            <a:off x="3081668" y="4191744"/>
+            <a:ext cx="485775" cy="533400"/>
+          </a:xfrm>
+          <a:prstGeom prst="ellipse">
+            <a:avLst/>
+          </a:prstGeom>
+          <a:ln>
+            <a:noFill/>
+          </a:ln>
+          <a:effectLst>
+            <a:softEdge rad="112500"/>
+          </a:effectLst>
+          <a:extLst>
+            <a:ext uri="{909E8E84-426E-40DD-AFC4-6F175D3DCCD1}">
+              <a14:hiddenFill xmlns:a14="http://schemas.microsoft.com/office/drawing/2010/main">
+                <a:solidFill>
+                  <a:srgbClr val="FFFFFF"/>
+                </a:solidFill>
+              </a14:hiddenFill>
+            </a:ext>
+          </a:extLst>
+        </p:spPr>
+      </p:pic>
+      <p:sp>
+        <p:nvSpPr>
+          <p:cNvPr id="26" name="CaixaDeTexto 25"/>
+          <p:cNvSpPr txBox="1"/>
+          <p:nvPr/>
+        </p:nvSpPr>
+        <p:spPr>
+          <a:xfrm>
+            <a:off x="251520" y="1220245"/>
+            <a:ext cx="1386662" cy="1256498"/>
+          </a:xfrm>
+          <a:prstGeom prst="rect">
+            <a:avLst/>
+          </a:prstGeom>
+        </p:spPr>
+        <p:style>
+          <a:lnRef idx="0">
+            <a:scrgbClr r="0" g="0" b="0"/>
+          </a:lnRef>
+          <a:fillRef idx="0">
+            <a:scrgbClr r="0" g="0" b="0"/>
+          </a:fillRef>
+          <a:effectRef idx="0">
+            <a:scrgbClr r="0" g="0" b="0"/>
+          </a:effectRef>
+          <a:fontRef idx="minor">
+            <a:schemeClr val="lt1"/>
+          </a:fontRef>
+        </p:style>
+        <p:txBody>
+          <a:bodyPr spcFirstLastPara="0" vert="horz" wrap="square" lIns="37465" tIns="37465" rIns="37465" bIns="37465" numCol="1" spcCol="1270" anchor="ctr" anchorCtr="0">
+            <a:noAutofit/>
+          </a:bodyPr>
+          <a:lstStyle/>
+          <a:p>
+            <a:pPr lvl="0" algn="ctr" defTabSz="2622550">
+              <a:lnSpc>
+                <a:spcPct val="90000"/>
+              </a:lnSpc>
+              <a:spcBef>
+                <a:spcPct val="0"/>
+              </a:spcBef>
+              <a:spcAft>
+                <a:spcPct val="35000"/>
+              </a:spcAft>
+            </a:pPr>
+            <a:r>
+              <a:rPr lang="pt-BR" sz="5900" kern="1200" dirty="0" smtClean="0"/>
+              <a:t> </a:t>
+            </a:r>
+            <a:endParaRPr lang="pt-BR" sz="5900" kern="1200" dirty="0"/>
+          </a:p>
+        </p:txBody>
+      </p:sp>
     </p:spTree>
     <p:extLst>
       <p:ext uri="{BB962C8B-B14F-4D97-AF65-F5344CB8AC3E}">
@@ -27969,7 +29308,7 @@
                             </p:stCondLst>
                             <p:childTnLst>
                               <p:par>
-                                <p:cTn id="5" presetID="1" presetClass="entr" presetSubtype="0" fill="hold" grpId="0" nodeType="clickEffect">
+                                <p:cTn id="5" presetID="1" presetClass="entr" presetSubtype="0" fill="hold" nodeType="clickEffect">
                                   <p:stCondLst>
                                     <p:cond delay="0"/>
                                   </p:stCondLst>
@@ -27982,7 +29321,7 @@
                                           </p:stCondLst>
                                         </p:cTn>
                                         <p:tgtEl>
-                                          <p:spTgt spid="21"/>
+                                          <p:spTgt spid="13"/>
                                         </p:tgtEl>
                                         <p:attrNameLst>
                                           <p:attrName>style.visibility</p:attrName>
@@ -28004,6 +29343,357 @@
                                     <p:set>
                                       <p:cBhvr>
                                         <p:cTn id="8" dur="1" fill="hold">
+                                          <p:stCondLst>
+                                            <p:cond delay="0"/>
+                                          </p:stCondLst>
+                                        </p:cTn>
+                                        <p:tgtEl>
+                                          <p:spTgt spid="12"/>
+                                        </p:tgtEl>
+                                        <p:attrNameLst>
+                                          <p:attrName>style.visibility</p:attrName>
+                                        </p:attrNameLst>
+                                      </p:cBhvr>
+                                      <p:to>
+                                        <p:strVal val="visible"/>
+                                      </p:to>
+                                    </p:set>
+                                  </p:childTnLst>
+                                </p:cTn>
+                              </p:par>
+                              <p:par>
+                                <p:cTn id="9" presetID="1" presetClass="entr" presetSubtype="0" fill="hold" nodeType="withEffect">
+                                  <p:stCondLst>
+                                    <p:cond delay="0"/>
+                                  </p:stCondLst>
+                                  <p:childTnLst>
+                                    <p:set>
+                                      <p:cBhvr>
+                                        <p:cTn id="10" dur="1" fill="hold">
+                                          <p:stCondLst>
+                                            <p:cond delay="0"/>
+                                          </p:stCondLst>
+                                        </p:cTn>
+                                        <p:tgtEl>
+                                          <p:spTgt spid="4"/>
+                                        </p:tgtEl>
+                                        <p:attrNameLst>
+                                          <p:attrName>style.visibility</p:attrName>
+                                        </p:attrNameLst>
+                                      </p:cBhvr>
+                                      <p:to>
+                                        <p:strVal val="visible"/>
+                                      </p:to>
+                                    </p:set>
+                                  </p:childTnLst>
+                                </p:cTn>
+                              </p:par>
+                              <p:par>
+                                <p:cTn id="11" presetID="1" presetClass="entr" presetSubtype="0" fill="hold" grpId="0" nodeType="withEffect">
+                                  <p:stCondLst>
+                                    <p:cond delay="0"/>
+                                  </p:stCondLst>
+                                  <p:childTnLst>
+                                    <p:set>
+                                      <p:cBhvr>
+                                        <p:cTn id="12" dur="1" fill="hold">
+                                          <p:stCondLst>
+                                            <p:cond delay="0"/>
+                                          </p:stCondLst>
+                                        </p:cTn>
+                                        <p:tgtEl>
+                                          <p:spTgt spid="16"/>
+                                        </p:tgtEl>
+                                        <p:attrNameLst>
+                                          <p:attrName>style.visibility</p:attrName>
+                                        </p:attrNameLst>
+                                      </p:cBhvr>
+                                      <p:to>
+                                        <p:strVal val="visible"/>
+                                      </p:to>
+                                    </p:set>
+                                  </p:childTnLst>
+                                </p:cTn>
+                              </p:par>
+                              <p:par>
+                                <p:cTn id="13" presetID="1" presetClass="entr" presetSubtype="0" fill="hold" grpId="0" nodeType="withEffect">
+                                  <p:stCondLst>
+                                    <p:cond delay="0"/>
+                                  </p:stCondLst>
+                                  <p:childTnLst>
+                                    <p:set>
+                                      <p:cBhvr>
+                                        <p:cTn id="14" dur="1" fill="hold">
+                                          <p:stCondLst>
+                                            <p:cond delay="0"/>
+                                          </p:stCondLst>
+                                        </p:cTn>
+                                        <p:tgtEl>
+                                          <p:spTgt spid="17"/>
+                                        </p:tgtEl>
+                                        <p:attrNameLst>
+                                          <p:attrName>style.visibility</p:attrName>
+                                        </p:attrNameLst>
+                                      </p:cBhvr>
+                                      <p:to>
+                                        <p:strVal val="visible"/>
+                                      </p:to>
+                                    </p:set>
+                                  </p:childTnLst>
+                                </p:cTn>
+                              </p:par>
+                            </p:childTnLst>
+                          </p:cTn>
+                        </p:par>
+                      </p:childTnLst>
+                    </p:cTn>
+                  </p:par>
+                  <p:par>
+                    <p:cTn id="15" fill="hold">
+                      <p:stCondLst>
+                        <p:cond delay="indefinite"/>
+                      </p:stCondLst>
+                      <p:childTnLst>
+                        <p:par>
+                          <p:cTn id="16" fill="hold">
+                            <p:stCondLst>
+                              <p:cond delay="0"/>
+                            </p:stCondLst>
+                            <p:childTnLst>
+                              <p:par>
+                                <p:cTn id="17" presetID="1" presetClass="entr" presetSubtype="0" fill="hold" nodeType="clickEffect">
+                                  <p:stCondLst>
+                                    <p:cond delay="0"/>
+                                  </p:stCondLst>
+                                  <p:childTnLst>
+                                    <p:set>
+                                      <p:cBhvr>
+                                        <p:cTn id="18" dur="1" fill="hold">
+                                          <p:stCondLst>
+                                            <p:cond delay="0"/>
+                                          </p:stCondLst>
+                                        </p:cTn>
+                                        <p:tgtEl>
+                                          <p:spTgt spid="9"/>
+                                        </p:tgtEl>
+                                        <p:attrNameLst>
+                                          <p:attrName>style.visibility</p:attrName>
+                                        </p:attrNameLst>
+                                      </p:cBhvr>
+                                      <p:to>
+                                        <p:strVal val="visible"/>
+                                      </p:to>
+                                    </p:set>
+                                  </p:childTnLst>
+                                </p:cTn>
+                              </p:par>
+                              <p:par>
+                                <p:cTn id="19" presetID="1" presetClass="entr" presetSubtype="0" fill="hold" grpId="0" nodeType="withEffect">
+                                  <p:stCondLst>
+                                    <p:cond delay="0"/>
+                                  </p:stCondLst>
+                                  <p:childTnLst>
+                                    <p:set>
+                                      <p:cBhvr>
+                                        <p:cTn id="20" dur="1" fill="hold">
+                                          <p:stCondLst>
+                                            <p:cond delay="0"/>
+                                          </p:stCondLst>
+                                        </p:cTn>
+                                        <p:tgtEl>
+                                          <p:spTgt spid="14"/>
+                                        </p:tgtEl>
+                                        <p:attrNameLst>
+                                          <p:attrName>style.visibility</p:attrName>
+                                        </p:attrNameLst>
+                                      </p:cBhvr>
+                                      <p:to>
+                                        <p:strVal val="visible"/>
+                                      </p:to>
+                                    </p:set>
+                                  </p:childTnLst>
+                                </p:cTn>
+                              </p:par>
+                              <p:par>
+                                <p:cTn id="21" presetID="1" presetClass="entr" presetSubtype="0" fill="hold" grpId="0" nodeType="withEffect">
+                                  <p:stCondLst>
+                                    <p:cond delay="0"/>
+                                  </p:stCondLst>
+                                  <p:childTnLst>
+                                    <p:set>
+                                      <p:cBhvr>
+                                        <p:cTn id="22" dur="1" fill="hold">
+                                          <p:stCondLst>
+                                            <p:cond delay="0"/>
+                                          </p:stCondLst>
+                                        </p:cTn>
+                                        <p:tgtEl>
+                                          <p:spTgt spid="11"/>
+                                        </p:tgtEl>
+                                        <p:attrNameLst>
+                                          <p:attrName>style.visibility</p:attrName>
+                                        </p:attrNameLst>
+                                      </p:cBhvr>
+                                      <p:to>
+                                        <p:strVal val="visible"/>
+                                      </p:to>
+                                    </p:set>
+                                  </p:childTnLst>
+                                </p:cTn>
+                              </p:par>
+                            </p:childTnLst>
+                          </p:cTn>
+                        </p:par>
+                      </p:childTnLst>
+                    </p:cTn>
+                  </p:par>
+                  <p:par>
+                    <p:cTn id="23" fill="hold">
+                      <p:stCondLst>
+                        <p:cond delay="indefinite"/>
+                      </p:stCondLst>
+                      <p:childTnLst>
+                        <p:par>
+                          <p:cTn id="24" fill="hold">
+                            <p:stCondLst>
+                              <p:cond delay="0"/>
+                            </p:stCondLst>
+                            <p:childTnLst>
+                              <p:par>
+                                <p:cTn id="25" presetID="1" presetClass="entr" presetSubtype="0" fill="hold" nodeType="clickEffect">
+                                  <p:stCondLst>
+                                    <p:cond delay="0"/>
+                                  </p:stCondLst>
+                                  <p:childTnLst>
+                                    <p:set>
+                                      <p:cBhvr>
+                                        <p:cTn id="26" dur="1" fill="hold">
+                                          <p:stCondLst>
+                                            <p:cond delay="0"/>
+                                          </p:stCondLst>
+                                        </p:cTn>
+                                        <p:tgtEl>
+                                          <p:spTgt spid="2050"/>
+                                        </p:tgtEl>
+                                        <p:attrNameLst>
+                                          <p:attrName>style.visibility</p:attrName>
+                                        </p:attrNameLst>
+                                      </p:cBhvr>
+                                      <p:to>
+                                        <p:strVal val="visible"/>
+                                      </p:to>
+                                    </p:set>
+                                  </p:childTnLst>
+                                </p:cTn>
+                              </p:par>
+                              <p:par>
+                                <p:cTn id="27" presetID="1" presetClass="entr" presetSubtype="0" fill="hold" grpId="0" nodeType="withEffect">
+                                  <p:stCondLst>
+                                    <p:cond delay="0"/>
+                                  </p:stCondLst>
+                                  <p:childTnLst>
+                                    <p:set>
+                                      <p:cBhvr>
+                                        <p:cTn id="28" dur="1" fill="hold">
+                                          <p:stCondLst>
+                                            <p:cond delay="0"/>
+                                          </p:stCondLst>
+                                        </p:cTn>
+                                        <p:tgtEl>
+                                          <p:spTgt spid="10"/>
+                                        </p:tgtEl>
+                                        <p:attrNameLst>
+                                          <p:attrName>style.visibility</p:attrName>
+                                        </p:attrNameLst>
+                                      </p:cBhvr>
+                                      <p:to>
+                                        <p:strVal val="visible"/>
+                                      </p:to>
+                                    </p:set>
+                                  </p:childTnLst>
+                                </p:cTn>
+                              </p:par>
+                              <p:par>
+                                <p:cTn id="29" presetID="1" presetClass="entr" presetSubtype="0" fill="hold" grpId="0" nodeType="withEffect">
+                                  <p:stCondLst>
+                                    <p:cond delay="0"/>
+                                  </p:stCondLst>
+                                  <p:childTnLst>
+                                    <p:set>
+                                      <p:cBhvr>
+                                        <p:cTn id="30" dur="1" fill="hold">
+                                          <p:stCondLst>
+                                            <p:cond delay="0"/>
+                                          </p:stCondLst>
+                                        </p:cTn>
+                                        <p:tgtEl>
+                                          <p:spTgt spid="15"/>
+                                        </p:tgtEl>
+                                        <p:attrNameLst>
+                                          <p:attrName>style.visibility</p:attrName>
+                                        </p:attrNameLst>
+                                      </p:cBhvr>
+                                      <p:to>
+                                        <p:strVal val="visible"/>
+                                      </p:to>
+                                    </p:set>
+                                  </p:childTnLst>
+                                </p:cTn>
+                              </p:par>
+                            </p:childTnLst>
+                          </p:cTn>
+                        </p:par>
+                      </p:childTnLst>
+                    </p:cTn>
+                  </p:par>
+                  <p:par>
+                    <p:cTn id="31" fill="hold">
+                      <p:stCondLst>
+                        <p:cond delay="indefinite"/>
+                      </p:stCondLst>
+                      <p:childTnLst>
+                        <p:par>
+                          <p:cTn id="32" fill="hold">
+                            <p:stCondLst>
+                              <p:cond delay="0"/>
+                            </p:stCondLst>
+                            <p:childTnLst>
+                              <p:par>
+                                <p:cTn id="33" presetID="1" presetClass="entr" presetSubtype="0" fill="hold" grpId="0" nodeType="clickEffect">
+                                  <p:stCondLst>
+                                    <p:cond delay="0"/>
+                                  </p:stCondLst>
+                                  <p:childTnLst>
+                                    <p:set>
+                                      <p:cBhvr>
+                                        <p:cTn id="34" dur="1" fill="hold">
+                                          <p:stCondLst>
+                                            <p:cond delay="0"/>
+                                          </p:stCondLst>
+                                        </p:cTn>
+                                        <p:tgtEl>
+                                          <p:spTgt spid="21"/>
+                                        </p:tgtEl>
+                                        <p:attrNameLst>
+                                          <p:attrName>style.visibility</p:attrName>
+                                        </p:attrNameLst>
+                                      </p:cBhvr>
+                                      <p:to>
+                                        <p:strVal val="visible"/>
+                                      </p:to>
+                                    </p:set>
+                                  </p:childTnLst>
+                                </p:cTn>
+                              </p:par>
+                              <p:par>
+                                <p:cTn id="35" presetID="1" presetClass="entr" presetSubtype="0" fill="hold" grpId="0" nodeType="withEffect">
+                                  <p:stCondLst>
+                                    <p:cond delay="0"/>
+                                  </p:stCondLst>
+                                  <p:childTnLst>
+                                    <p:set>
+                                      <p:cBhvr>
+                                        <p:cTn id="36" dur="1" fill="hold">
                                           <p:stCondLst>
                                             <p:cond delay="0"/>
                                           </p:stCondLst>
@@ -28050,6 +29740,13 @@
       </p:par>
     </p:tnLst>
     <p:bldLst>
+      <p:bldP spid="10" grpId="0" animBg="1"/>
+      <p:bldP spid="11" grpId="0" animBg="1"/>
+      <p:bldP spid="12" grpId="0" animBg="1"/>
+      <p:bldP spid="14" grpId="0"/>
+      <p:bldP spid="15" grpId="0"/>
+      <p:bldP spid="16" grpId="0"/>
+      <p:bldP spid="17" grpId="0"/>
       <p:bldP spid="21" grpId="0" animBg="1"/>
       <p:bldP spid="22" grpId="0"/>
     </p:bldLst>

</xml_diff>